<commit_message>
Papildināta prezentācija ar funkcijām, to paskaidrojumiem un piemēriem
</commit_message>
<xml_diff>
--- a/MacibuMaterialsProgEks.pptx
+++ b/MacibuMaterialsProgEks.pptx
@@ -5,11 +5,20 @@
     <p:sldMasterId id="2147483648" r:id="rId1"/>
   </p:sldMasterIdLst>
   <p:handoutMasterIdLst>
-    <p:handoutMasterId r:id="rId5"/>
+    <p:handoutMasterId r:id="rId14"/>
   </p:handoutMasterIdLst>
   <p:sldIdLst>
     <p:sldId id="256" r:id="rId3"/>
     <p:sldId id="257" r:id="rId4"/>
+    <p:sldId id="258" r:id="rId5"/>
+    <p:sldId id="259" r:id="rId6"/>
+    <p:sldId id="260" r:id="rId7"/>
+    <p:sldId id="261" r:id="rId8"/>
+    <p:sldId id="262" r:id="rId9"/>
+    <p:sldId id="263" r:id="rId10"/>
+    <p:sldId id="264" r:id="rId11"/>
+    <p:sldId id="265" r:id="rId12"/>
+    <p:sldId id="266" r:id="rId13"/>
   </p:sldIdLst>
   <p:sldSz cx="12192000" cy="6858000"/>
   <p:notesSz cx="6858000" cy="9144000"/>
@@ -3266,7 +3275,7 @@
           <a:p>
             <a:r>
               <a:rPr lang="en-US" altLang="en-US" b="1"/>
-              <a:t>Funkcijas darbam ar simboliem un simbolu virknēm</a:t>
+              <a:t>Visbiežāk lietotās funkcijas darbam ar simboliem un simbolu virknēm</a:t>
             </a:r>
             <a:endParaRPr lang="en-US" altLang="en-US" b="1"/>
           </a:p>
@@ -3291,6 +3300,331 @@
               <a:t>Markuss Kalniņš 2PT</a:t>
             </a:r>
             <a:endParaRPr lang="en-US" sz="2000"/>
+          </a:p>
+        </p:txBody>
+      </p:sp>
+    </p:spTree>
+  </p:cSld>
+  <p:clrMapOvr>
+    <a:masterClrMapping/>
+  </p:clrMapOvr>
+</p:sld>
+</file>
+
+<file path=ppt/slides/slide10.xml><?xml version="1.0" encoding="utf-8"?>
+<p:sld xmlns:a="http://schemas.openxmlformats.org/drawingml/2006/main" xmlns:r="http://schemas.openxmlformats.org/officeDocument/2006/relationships" xmlns:p="http://schemas.openxmlformats.org/presentationml/2006/main">
+  <p:cSld>
+    <p:spTree>
+      <p:nvGrpSpPr>
+        <p:cNvPr id="1" name=""/>
+        <p:cNvGrpSpPr/>
+        <p:nvPr/>
+      </p:nvGrpSpPr>
+      <p:grpSpPr/>
+      <p:sp>
+        <p:nvSpPr>
+          <p:cNvPr id="2" name="Title 1"/>
+          <p:cNvSpPr>
+            <a:spLocks noGrp="1"/>
+          </p:cNvSpPr>
+          <p:nvPr>
+            <p:ph type="title"/>
+          </p:nvPr>
+        </p:nvSpPr>
+        <p:spPr/>
+        <p:txBody>
+          <a:bodyPr/>
+          <a:p>
+            <a:r>
+              <a:rPr lang="en-US"/>
+              <a:t>Funkciju piemēri</a:t>
+            </a:r>
+            <a:endParaRPr lang="en-US"/>
+          </a:p>
+        </p:txBody>
+      </p:sp>
+      <p:sp>
+        <p:nvSpPr>
+          <p:cNvPr id="3" name="Content Placeholder 2"/>
+          <p:cNvSpPr>
+            <a:spLocks noGrp="1"/>
+          </p:cNvSpPr>
+          <p:nvPr>
+            <p:ph idx="1"/>
+          </p:nvPr>
+        </p:nvSpPr>
+        <p:spPr/>
+        <p:txBody>
+          <a:bodyPr/>
+          <a:p>
+            <a:r>
+              <a:rPr lang="en-US"/>
+              <a:t>equals un equalsIgnoreCase</a:t>
+            </a:r>
+            <a:endParaRPr lang="en-US"/>
+          </a:p>
+        </p:txBody>
+      </p:sp>
+      <p:pic>
+        <p:nvPicPr>
+          <p:cNvPr id="4" name="Picture 3"/>
+          <p:cNvPicPr>
+            <a:picLocks noChangeAspect="1"/>
+          </p:cNvPicPr>
+          <p:nvPr/>
+        </p:nvPicPr>
+        <p:blipFill>
+          <a:blip r:embed="rId1"/>
+          <a:stretch>
+            <a:fillRect/>
+          </a:stretch>
+        </p:blipFill>
+        <p:spPr>
+          <a:xfrm>
+            <a:off x="838200" y="2642870"/>
+            <a:ext cx="3819525" cy="1571625"/>
+          </a:xfrm>
+          <a:prstGeom prst="rect">
+            <a:avLst/>
+          </a:prstGeom>
+        </p:spPr>
+      </p:pic>
+      <p:pic>
+        <p:nvPicPr>
+          <p:cNvPr id="6" name="Picture 5"/>
+          <p:cNvPicPr>
+            <a:picLocks noChangeAspect="1"/>
+          </p:cNvPicPr>
+          <p:nvPr/>
+        </p:nvPicPr>
+        <p:blipFill>
+          <a:blip r:embed="rId2"/>
+          <a:stretch>
+            <a:fillRect/>
+          </a:stretch>
+        </p:blipFill>
+        <p:spPr>
+          <a:xfrm>
+            <a:off x="838200" y="4627245"/>
+            <a:ext cx="4486275" cy="1619250"/>
+          </a:xfrm>
+          <a:prstGeom prst="rect">
+            <a:avLst/>
+          </a:prstGeom>
+        </p:spPr>
+      </p:pic>
+      <p:sp>
+        <p:nvSpPr>
+          <p:cNvPr id="10" name="Text Box 9"/>
+          <p:cNvSpPr txBox="1"/>
+          <p:nvPr/>
+        </p:nvSpPr>
+        <p:spPr>
+          <a:xfrm>
+            <a:off x="5546725" y="2642870"/>
+            <a:ext cx="1403350" cy="922020"/>
+          </a:xfrm>
+          <a:prstGeom prst="rect">
+            <a:avLst/>
+          </a:prstGeom>
+          <a:noFill/>
+        </p:spPr>
+        <p:txBody>
+          <a:bodyPr wrap="square" rtlCol="0">
+            <a:spAutoFit/>
+          </a:bodyPr>
+          <a:p>
+            <a:r>
+              <a:rPr lang="en-US"/>
+              <a:t>Izvade:</a:t>
+            </a:r>
+            <a:endParaRPr lang="en-US"/>
+          </a:p>
+          <a:p>
+            <a:r>
+              <a:rPr lang="en-US"/>
+              <a:t>true</a:t>
+            </a:r>
+            <a:endParaRPr lang="en-US"/>
+          </a:p>
+          <a:p>
+            <a:r>
+              <a:rPr lang="en-US"/>
+              <a:t>false</a:t>
+            </a:r>
+            <a:endParaRPr lang="en-US"/>
+          </a:p>
+        </p:txBody>
+      </p:sp>
+      <p:sp>
+        <p:nvSpPr>
+          <p:cNvPr id="8" name="Text Box 7"/>
+          <p:cNvSpPr txBox="1"/>
+          <p:nvPr/>
+        </p:nvSpPr>
+        <p:spPr>
+          <a:xfrm>
+            <a:off x="5546725" y="4627245"/>
+            <a:ext cx="1403350" cy="922020"/>
+          </a:xfrm>
+          <a:prstGeom prst="rect">
+            <a:avLst/>
+          </a:prstGeom>
+          <a:noFill/>
+        </p:spPr>
+        <p:txBody>
+          <a:bodyPr wrap="square" rtlCol="0">
+            <a:spAutoFit/>
+          </a:bodyPr>
+          <a:p>
+            <a:r>
+              <a:rPr lang="en-US"/>
+              <a:t>Izvade:</a:t>
+            </a:r>
+            <a:endParaRPr lang="en-US"/>
+          </a:p>
+          <a:p>
+            <a:r>
+              <a:rPr lang="en-US"/>
+              <a:t>true</a:t>
+            </a:r>
+            <a:endParaRPr lang="en-US"/>
+          </a:p>
+          <a:p>
+            <a:r>
+              <a:rPr lang="en-US"/>
+              <a:t>false</a:t>
+            </a:r>
+            <a:endParaRPr lang="en-US"/>
+          </a:p>
+        </p:txBody>
+      </p:sp>
+    </p:spTree>
+  </p:cSld>
+  <p:clrMapOvr>
+    <a:masterClrMapping/>
+  </p:clrMapOvr>
+</p:sld>
+</file>
+
+<file path=ppt/slides/slide11.xml><?xml version="1.0" encoding="utf-8"?>
+<p:sld xmlns:a="http://schemas.openxmlformats.org/drawingml/2006/main" xmlns:r="http://schemas.openxmlformats.org/officeDocument/2006/relationships" xmlns:p="http://schemas.openxmlformats.org/presentationml/2006/main">
+  <p:cSld>
+    <p:spTree>
+      <p:nvGrpSpPr>
+        <p:cNvPr id="1" name=""/>
+        <p:cNvGrpSpPr/>
+        <p:nvPr/>
+      </p:nvGrpSpPr>
+      <p:grpSpPr/>
+      <p:sp>
+        <p:nvSpPr>
+          <p:cNvPr id="2" name="Title 1"/>
+          <p:cNvSpPr>
+            <a:spLocks noGrp="1"/>
+          </p:cNvSpPr>
+          <p:nvPr>
+            <p:ph type="title"/>
+          </p:nvPr>
+        </p:nvSpPr>
+        <p:spPr/>
+        <p:txBody>
+          <a:bodyPr/>
+          <a:p>
+            <a:r>
+              <a:rPr lang="en-US"/>
+              <a:t>Funkciju piemēri</a:t>
+            </a:r>
+            <a:endParaRPr lang="en-US"/>
+          </a:p>
+        </p:txBody>
+      </p:sp>
+      <p:sp>
+        <p:nvSpPr>
+          <p:cNvPr id="3" name="Content Placeholder 2"/>
+          <p:cNvSpPr>
+            <a:spLocks noGrp="1"/>
+          </p:cNvSpPr>
+          <p:nvPr>
+            <p:ph idx="1"/>
+          </p:nvPr>
+        </p:nvSpPr>
+        <p:spPr/>
+        <p:txBody>
+          <a:bodyPr/>
+          <a:p>
+            <a:r>
+              <a:rPr lang="en-US"/>
+              <a:t>toUpperCase un toLowerCase</a:t>
+            </a:r>
+            <a:endParaRPr lang="en-US"/>
+          </a:p>
+        </p:txBody>
+      </p:sp>
+      <p:pic>
+        <p:nvPicPr>
+          <p:cNvPr id="4" name="Picture 3"/>
+          <p:cNvPicPr>
+            <a:picLocks noChangeAspect="1"/>
+          </p:cNvPicPr>
+          <p:nvPr/>
+        </p:nvPicPr>
+        <p:blipFill>
+          <a:blip r:embed="rId1"/>
+          <a:stretch>
+            <a:fillRect/>
+          </a:stretch>
+        </p:blipFill>
+        <p:spPr>
+          <a:xfrm>
+            <a:off x="838200" y="2537460"/>
+            <a:ext cx="3390900" cy="1266825"/>
+          </a:xfrm>
+          <a:prstGeom prst="rect">
+            <a:avLst/>
+          </a:prstGeom>
+        </p:spPr>
+      </p:pic>
+      <p:sp>
+        <p:nvSpPr>
+          <p:cNvPr id="10" name="Text Box 9"/>
+          <p:cNvSpPr txBox="1"/>
+          <p:nvPr/>
+        </p:nvSpPr>
+        <p:spPr>
+          <a:xfrm>
+            <a:off x="4996180" y="2537460"/>
+            <a:ext cx="1918335" cy="922020"/>
+          </a:xfrm>
+          <a:prstGeom prst="rect">
+            <a:avLst/>
+          </a:prstGeom>
+          <a:noFill/>
+        </p:spPr>
+        <p:txBody>
+          <a:bodyPr wrap="square" rtlCol="0">
+            <a:spAutoFit/>
+          </a:bodyPr>
+          <a:p>
+            <a:r>
+              <a:rPr lang="en-US"/>
+              <a:t>Izvade:</a:t>
+            </a:r>
+            <a:endParaRPr lang="en-US"/>
+          </a:p>
+          <a:p>
+            <a:r>
+              <a:rPr lang="en-US"/>
+              <a:t>HELLO WORLD</a:t>
+            </a:r>
+            <a:endParaRPr lang="en-US"/>
+          </a:p>
+          <a:p>
+            <a:r>
+              <a:rPr lang="en-US"/>
+              <a:t>hello world</a:t>
+            </a:r>
+            <a:endParaRPr lang="en-US"/>
           </a:p>
         </p:txBody>
       </p:sp>
@@ -3326,6 +3660,10 @@
         <p:txBody>
           <a:bodyPr/>
           <a:p>
+            <a:r>
+              <a:rPr lang="en-US"/>
+              <a:t>Kas ir simboli (char)</a:t>
+            </a:r>
             <a:endParaRPr lang="en-US"/>
           </a:p>
         </p:txBody>
@@ -3344,6 +3682,1308 @@
         <p:txBody>
           <a:bodyPr/>
           <a:p>
+            <a:r>
+              <a:rPr lang="en-US" altLang="en-US"/>
+              <a:t>Datu tips "char" tiek izmantots vienas rakstzīmes glabā</a:t>
+            </a:r>
+            <a:r>
+              <a:rPr lang="" altLang="en-US"/>
+              <a:t>š</a:t>
+            </a:r>
+            <a:r>
+              <a:rPr lang="en-US" altLang="en-US"/>
+              <a:t>anai. Rakstzīmei jābūt ietvertai vienpēdi</a:t>
+            </a:r>
+            <a:r>
+              <a:rPr lang="" altLang="en-US"/>
+              <a:t>ņ</a:t>
+            </a:r>
+            <a:r>
+              <a:rPr lang="en-US" altLang="en-US"/>
+              <a:t>ās, piemēram, ‘A’ vai ‘c’</a:t>
+            </a:r>
+            <a:endParaRPr lang="en-US" altLang="en-US"/>
+          </a:p>
+        </p:txBody>
+      </p:sp>
+      <p:pic>
+        <p:nvPicPr>
+          <p:cNvPr id="3" name="Picture 2"/>
+          <p:cNvPicPr>
+            <a:picLocks noChangeAspect="1"/>
+          </p:cNvPicPr>
+          <p:nvPr/>
+        </p:nvPicPr>
+        <p:blipFill>
+          <a:blip r:embed="rId1"/>
+          <a:stretch>
+            <a:fillRect/>
+          </a:stretch>
+        </p:blipFill>
+        <p:spPr>
+          <a:xfrm>
+            <a:off x="1135380" y="2854960"/>
+            <a:ext cx="5137150" cy="1626235"/>
+          </a:xfrm>
+          <a:prstGeom prst="rect">
+            <a:avLst/>
+          </a:prstGeom>
+        </p:spPr>
+      </p:pic>
+      <p:pic>
+        <p:nvPicPr>
+          <p:cNvPr id="6" name="Picture 5"/>
+          <p:cNvPicPr>
+            <a:picLocks noChangeAspect="1"/>
+          </p:cNvPicPr>
+          <p:nvPr/>
+        </p:nvPicPr>
+        <p:blipFill>
+          <a:blip r:embed="rId2"/>
+          <a:stretch>
+            <a:fillRect/>
+          </a:stretch>
+        </p:blipFill>
+        <p:spPr>
+          <a:xfrm>
+            <a:off x="7069455" y="3331210"/>
+            <a:ext cx="454025" cy="501015"/>
+          </a:xfrm>
+          <a:prstGeom prst="rect">
+            <a:avLst/>
+          </a:prstGeom>
+        </p:spPr>
+      </p:pic>
+      <p:sp>
+        <p:nvSpPr>
+          <p:cNvPr id="7" name="Text Box 6"/>
+          <p:cNvSpPr txBox="1"/>
+          <p:nvPr/>
+        </p:nvSpPr>
+        <p:spPr>
+          <a:xfrm>
+            <a:off x="6873875" y="2854960"/>
+            <a:ext cx="1403350" cy="368300"/>
+          </a:xfrm>
+          <a:prstGeom prst="rect">
+            <a:avLst/>
+          </a:prstGeom>
+          <a:noFill/>
+        </p:spPr>
+        <p:txBody>
+          <a:bodyPr wrap="square" rtlCol="0">
+            <a:spAutoFit/>
+          </a:bodyPr>
+          <a:p>
+            <a:r>
+              <a:rPr lang="en-US"/>
+              <a:t>Izvade:</a:t>
+            </a:r>
+            <a:endParaRPr lang="en-US"/>
+          </a:p>
+        </p:txBody>
+      </p:sp>
+    </p:spTree>
+  </p:cSld>
+  <p:clrMapOvr>
+    <a:masterClrMapping/>
+  </p:clrMapOvr>
+</p:sld>
+</file>
+
+<file path=ppt/slides/slide3.xml><?xml version="1.0" encoding="utf-8"?>
+<p:sld xmlns:a="http://schemas.openxmlformats.org/drawingml/2006/main" xmlns:r="http://schemas.openxmlformats.org/officeDocument/2006/relationships" xmlns:p="http://schemas.openxmlformats.org/presentationml/2006/main">
+  <p:cSld>
+    <p:spTree>
+      <p:nvGrpSpPr>
+        <p:cNvPr id="1" name=""/>
+        <p:cNvGrpSpPr/>
+        <p:nvPr/>
+      </p:nvGrpSpPr>
+      <p:grpSpPr/>
+      <p:sp>
+        <p:nvSpPr>
+          <p:cNvPr id="2" name="Title 1"/>
+          <p:cNvSpPr>
+            <a:spLocks noGrp="1"/>
+          </p:cNvSpPr>
+          <p:nvPr>
+            <p:ph type="title"/>
+          </p:nvPr>
+        </p:nvSpPr>
+        <p:spPr/>
+        <p:txBody>
+          <a:bodyPr/>
+          <a:p>
+            <a:r>
+              <a:rPr lang="en-US"/>
+              <a:t>Kas ir simbolu virkne (String)</a:t>
+            </a:r>
+            <a:endParaRPr lang="en-US"/>
+          </a:p>
+        </p:txBody>
+      </p:sp>
+      <p:sp>
+        <p:nvSpPr>
+          <p:cNvPr id="3" name="Content Placeholder 2"/>
+          <p:cNvSpPr>
+            <a:spLocks noGrp="1"/>
+          </p:cNvSpPr>
+          <p:nvPr>
+            <p:ph idx="1"/>
+          </p:nvPr>
+        </p:nvSpPr>
+        <p:spPr/>
+        <p:txBody>
+          <a:bodyPr/>
+          <a:p>
+            <a:r>
+              <a:rPr lang="en-US" altLang="en-US"/>
+              <a:t>Virknes mainīgais satur rakstzīmju kopu, kas ietverta pēdi</a:t>
+            </a:r>
+            <a:r>
+              <a:rPr lang="" altLang="en-US"/>
+              <a:t>ņ</a:t>
+            </a:r>
+            <a:r>
+              <a:rPr lang="en-US" altLang="en-US"/>
+              <a:t>ās.</a:t>
+            </a:r>
+            <a:endParaRPr lang="en-US" altLang="en-US"/>
+          </a:p>
+        </p:txBody>
+      </p:sp>
+      <p:pic>
+        <p:nvPicPr>
+          <p:cNvPr id="4" name="Picture 3"/>
+          <p:cNvPicPr>
+            <a:picLocks noChangeAspect="1"/>
+          </p:cNvPicPr>
+          <p:nvPr/>
+        </p:nvPicPr>
+        <p:blipFill>
+          <a:blip r:embed="rId1"/>
+          <a:stretch>
+            <a:fillRect/>
+          </a:stretch>
+        </p:blipFill>
+        <p:spPr>
+          <a:xfrm>
+            <a:off x="981075" y="2451735"/>
+            <a:ext cx="5198110" cy="1626235"/>
+          </a:xfrm>
+          <a:prstGeom prst="rect">
+            <a:avLst/>
+          </a:prstGeom>
+        </p:spPr>
+      </p:pic>
+      <p:pic>
+        <p:nvPicPr>
+          <p:cNvPr id="5" name="Picture 4"/>
+          <p:cNvPicPr>
+            <a:picLocks noChangeAspect="1"/>
+          </p:cNvPicPr>
+          <p:nvPr/>
+        </p:nvPicPr>
+        <p:blipFill>
+          <a:blip r:embed="rId2"/>
+          <a:stretch>
+            <a:fillRect/>
+          </a:stretch>
+        </p:blipFill>
+        <p:spPr>
+          <a:xfrm>
+            <a:off x="6929755" y="3152775"/>
+            <a:ext cx="730250" cy="365125"/>
+          </a:xfrm>
+          <a:prstGeom prst="rect">
+            <a:avLst/>
+          </a:prstGeom>
+        </p:spPr>
+      </p:pic>
+      <p:sp>
+        <p:nvSpPr>
+          <p:cNvPr id="7" name="Text Box 6"/>
+          <p:cNvSpPr txBox="1"/>
+          <p:nvPr/>
+        </p:nvSpPr>
+        <p:spPr>
+          <a:xfrm>
+            <a:off x="6873875" y="2694940"/>
+            <a:ext cx="1403350" cy="368300"/>
+          </a:xfrm>
+          <a:prstGeom prst="rect">
+            <a:avLst/>
+          </a:prstGeom>
+          <a:noFill/>
+        </p:spPr>
+        <p:txBody>
+          <a:bodyPr wrap="square" rtlCol="0">
+            <a:spAutoFit/>
+          </a:bodyPr>
+          <a:p>
+            <a:r>
+              <a:rPr lang="en-US"/>
+              <a:t>Izvade:</a:t>
+            </a:r>
+            <a:endParaRPr lang="en-US"/>
+          </a:p>
+        </p:txBody>
+      </p:sp>
+    </p:spTree>
+  </p:cSld>
+  <p:clrMapOvr>
+    <a:masterClrMapping/>
+  </p:clrMapOvr>
+</p:sld>
+</file>
+
+<file path=ppt/slides/slide4.xml><?xml version="1.0" encoding="utf-8"?>
+<p:sld xmlns:a="http://schemas.openxmlformats.org/drawingml/2006/main" xmlns:r="http://schemas.openxmlformats.org/officeDocument/2006/relationships" xmlns:p="http://schemas.openxmlformats.org/presentationml/2006/main">
+  <p:cSld>
+    <p:spTree>
+      <p:nvGrpSpPr>
+        <p:cNvPr id="1" name=""/>
+        <p:cNvGrpSpPr/>
+        <p:nvPr/>
+      </p:nvGrpSpPr>
+      <p:grpSpPr/>
+      <p:sp>
+        <p:nvSpPr>
+          <p:cNvPr id="2" name="Title 1"/>
+          <p:cNvSpPr>
+            <a:spLocks noGrp="1"/>
+          </p:cNvSpPr>
+          <p:nvPr>
+            <p:ph type="title"/>
+          </p:nvPr>
+        </p:nvSpPr>
+        <p:spPr/>
+        <p:txBody>
+          <a:bodyPr/>
+          <a:p>
+            <a:r>
+              <a:rPr lang="en-US"/>
+              <a:t>Pamata funkcijas (char)</a:t>
+            </a:r>
+            <a:endParaRPr lang="en-US"/>
+          </a:p>
+        </p:txBody>
+      </p:sp>
+      <p:sp>
+        <p:nvSpPr>
+          <p:cNvPr id="3" name="Content Placeholder 2"/>
+          <p:cNvSpPr>
+            <a:spLocks noGrp="1"/>
+          </p:cNvSpPr>
+          <p:nvPr>
+            <p:ph idx="1"/>
+          </p:nvPr>
+        </p:nvSpPr>
+        <p:spPr>
+          <a:xfrm>
+            <a:off x="838200" y="1825625"/>
+            <a:ext cx="10515600" cy="3409950"/>
+          </a:xfrm>
+        </p:spPr>
+        <p:txBody>
+          <a:bodyPr>
+            <a:normAutofit lnSpcReduction="20000"/>
+          </a:bodyPr>
+          <a:p>
+            <a:r>
+              <a:rPr lang="en-US" altLang="en-US"/>
+              <a:t>Character.isLetter('a')</a:t>
+            </a:r>
+            <a:endParaRPr lang="en-US" altLang="en-US"/>
+          </a:p>
+          <a:p>
+            <a:pPr lvl="1"/>
+            <a:r>
+              <a:rPr lang="en-US" altLang="en-US"/>
+              <a:t>Pārbauda vai dotais simbols ir burts</a:t>
+            </a:r>
+            <a:endParaRPr lang="en-US" altLang="en-US"/>
+          </a:p>
+          <a:p>
+            <a:pPr lvl="2"/>
+            <a:r>
+              <a:rPr lang="en-US" altLang="en-US">
+                <a:sym typeface="+mn-ea"/>
+              </a:rPr>
+              <a:t>Atbildes formāts </a:t>
+            </a:r>
+            <a:r>
+              <a:rPr lang="en-US" altLang="en-US"/>
+              <a:t>(true, false)</a:t>
+            </a:r>
+            <a:endParaRPr lang="en-US" altLang="en-US"/>
+          </a:p>
+          <a:p>
+            <a:r>
+              <a:rPr lang="en-US" altLang="en-US"/>
+              <a:t>Character.isDigit('5')</a:t>
+            </a:r>
+            <a:endParaRPr lang="en-US" altLang="en-US"/>
+          </a:p>
+          <a:p>
+            <a:pPr lvl="1"/>
+            <a:r>
+              <a:rPr lang="en-US" altLang="en-US"/>
+              <a:t>Pārbauda vai dotais simbols ir cipars</a:t>
+            </a:r>
+            <a:endParaRPr lang="en-US" altLang="en-US"/>
+          </a:p>
+          <a:p>
+            <a:pPr lvl="2"/>
+            <a:r>
+              <a:rPr lang="en-US" altLang="en-US">
+                <a:sym typeface="+mn-ea"/>
+              </a:rPr>
+              <a:t>Atbildes formāts </a:t>
+            </a:r>
+            <a:r>
+              <a:rPr lang="en-US" altLang="en-US"/>
+              <a:t>(true, false)</a:t>
+            </a:r>
+            <a:endParaRPr lang="en-US" altLang="en-US"/>
+          </a:p>
+          <a:p>
+            <a:r>
+              <a:rPr lang="en-US" altLang="en-US"/>
+              <a:t>Character.isWhitespace(' ')</a:t>
+            </a:r>
+            <a:endParaRPr lang="en-US" altLang="en-US"/>
+          </a:p>
+          <a:p>
+            <a:pPr lvl="1"/>
+            <a:r>
+              <a:rPr lang="en-US" altLang="en-US"/>
+              <a:t>Pārbauda vai dotais simbols ir atstarpe</a:t>
+            </a:r>
+            <a:endParaRPr lang="en-US" altLang="en-US"/>
+          </a:p>
+          <a:p>
+            <a:pPr lvl="2"/>
+            <a:r>
+              <a:rPr lang="en-US" altLang="en-US">
+                <a:sym typeface="+mn-ea"/>
+              </a:rPr>
+              <a:t>Atbildes formāts </a:t>
+            </a:r>
+            <a:r>
+              <a:rPr lang="en-US" altLang="en-US"/>
+              <a:t>(true, false)</a:t>
+            </a:r>
+            <a:endParaRPr lang="en-US" altLang="en-US"/>
+          </a:p>
+        </p:txBody>
+      </p:sp>
+    </p:spTree>
+  </p:cSld>
+  <p:clrMapOvr>
+    <a:masterClrMapping/>
+  </p:clrMapOvr>
+</p:sld>
+</file>
+
+<file path=ppt/slides/slide5.xml><?xml version="1.0" encoding="utf-8"?>
+<p:sld xmlns:a="http://schemas.openxmlformats.org/drawingml/2006/main" xmlns:r="http://schemas.openxmlformats.org/officeDocument/2006/relationships" xmlns:p="http://schemas.openxmlformats.org/presentationml/2006/main">
+  <p:cSld>
+    <p:spTree>
+      <p:nvGrpSpPr>
+        <p:cNvPr id="1" name=""/>
+        <p:cNvGrpSpPr/>
+        <p:nvPr/>
+      </p:nvGrpSpPr>
+      <p:grpSpPr/>
+      <p:sp>
+        <p:nvSpPr>
+          <p:cNvPr id="2" name="Title 1"/>
+          <p:cNvSpPr>
+            <a:spLocks noGrp="1"/>
+          </p:cNvSpPr>
+          <p:nvPr>
+            <p:ph type="title"/>
+          </p:nvPr>
+        </p:nvSpPr>
+        <p:spPr/>
+        <p:txBody>
+          <a:bodyPr/>
+          <a:p>
+            <a:r>
+              <a:rPr lang="en-US"/>
+              <a:t>Pamata funkcijas (String)</a:t>
+            </a:r>
+            <a:endParaRPr lang="en-US"/>
+          </a:p>
+        </p:txBody>
+      </p:sp>
+      <p:sp>
+        <p:nvSpPr>
+          <p:cNvPr id="3" name="Content Placeholder 2"/>
+          <p:cNvSpPr>
+            <a:spLocks noGrp="1"/>
+          </p:cNvSpPr>
+          <p:nvPr>
+            <p:ph idx="1"/>
+          </p:nvPr>
+        </p:nvSpPr>
+        <p:spPr/>
+        <p:txBody>
+          <a:bodyPr>
+            <a:normAutofit lnSpcReduction="20000"/>
+          </a:bodyPr>
+          <a:p>
+            <a:r>
+              <a:rPr lang="en-US" altLang="en-US"/>
+              <a:t>str.length()</a:t>
+            </a:r>
+            <a:endParaRPr lang="en-US" altLang="en-US"/>
+          </a:p>
+          <a:p>
+            <a:pPr lvl="1"/>
+            <a:r>
+              <a:rPr lang="en-US" altLang="en-US"/>
+              <a:t>Nosaka simbolu virknes garumu</a:t>
+            </a:r>
+            <a:endParaRPr lang="en-US" altLang="en-US"/>
+          </a:p>
+          <a:p>
+            <a:pPr lvl="2"/>
+            <a:r>
+              <a:rPr lang="en-US" altLang="en-US">
+                <a:sym typeface="+mn-ea"/>
+              </a:rPr>
+              <a:t>Atbildes formāts </a:t>
+            </a:r>
+            <a:r>
+              <a:rPr lang="en-US" altLang="en-US" sz="2000"/>
+              <a:t>(4)</a:t>
+            </a:r>
+            <a:endParaRPr lang="en-US" altLang="en-US"/>
+          </a:p>
+          <a:p>
+            <a:r>
+              <a:rPr lang="en-US" altLang="en-US"/>
+              <a:t>str.charAt(0)</a:t>
+            </a:r>
+            <a:endParaRPr lang="en-US" altLang="en-US"/>
+          </a:p>
+          <a:p>
+            <a:pPr lvl="1"/>
+            <a:r>
+              <a:rPr lang="en-US" altLang="en-US"/>
+              <a:t>Nosaka simbolu kas atrodas dotā indexa vietā</a:t>
+            </a:r>
+            <a:endParaRPr lang="en-US" altLang="en-US"/>
+          </a:p>
+          <a:p>
+            <a:pPr lvl="2"/>
+            <a:r>
+              <a:rPr lang="en-US" altLang="en-US">
+                <a:sym typeface="+mn-ea"/>
+              </a:rPr>
+              <a:t>Atbildes formāts </a:t>
+            </a:r>
+            <a:r>
+              <a:rPr lang="en-US" altLang="en-US" sz="2000"/>
+              <a:t>(‘a’)</a:t>
+            </a:r>
+            <a:endParaRPr lang="en-US" altLang="en-US"/>
+          </a:p>
+          <a:p>
+            <a:r>
+              <a:rPr lang="en-US" altLang="en-US"/>
+              <a:t>str.equals("abc")</a:t>
+            </a:r>
+            <a:endParaRPr lang="en-US" altLang="en-US"/>
+          </a:p>
+          <a:p>
+            <a:pPr lvl="1"/>
+            <a:r>
+              <a:rPr lang="en-US" altLang="en-US"/>
+              <a:t>Salīdzina divas virknes</a:t>
+            </a:r>
+            <a:endParaRPr lang="en-US" altLang="en-US"/>
+          </a:p>
+          <a:p>
+            <a:pPr lvl="2"/>
+            <a:r>
+              <a:rPr lang="en-US" altLang="en-US">
+                <a:sym typeface="+mn-ea"/>
+              </a:rPr>
+              <a:t>Atbildes formāts </a:t>
+            </a:r>
+            <a:r>
+              <a:rPr lang="en-US" altLang="en-US"/>
+              <a:t>(true)</a:t>
+            </a:r>
+            <a:endParaRPr lang="en-US" altLang="en-US"/>
+          </a:p>
+          <a:p>
+            <a:r>
+              <a:rPr lang="en-US" altLang="en-US"/>
+              <a:t>str.equalsIgnoreCase("AbC")</a:t>
+            </a:r>
+            <a:endParaRPr lang="en-US" altLang="en-US"/>
+          </a:p>
+          <a:p>
+            <a:pPr lvl="1"/>
+            <a:r>
+              <a:rPr lang="en-US" altLang="en-US"/>
+              <a:t>Salīdzina divas virknes ignorējot lielo un mazo burtu at</a:t>
+            </a:r>
+            <a:r>
+              <a:rPr lang="" altLang="en-US"/>
+              <a:t>šķ</a:t>
+            </a:r>
+            <a:r>
+              <a:rPr lang="en-US" altLang="en-US"/>
+              <a:t>irības</a:t>
+            </a:r>
+            <a:endParaRPr lang="en-US" altLang="en-US"/>
+          </a:p>
+          <a:p>
+            <a:pPr lvl="2"/>
+            <a:r>
+              <a:rPr lang="en-US" altLang="en-US">
+                <a:sym typeface="+mn-ea"/>
+              </a:rPr>
+              <a:t>Atbildes formāts </a:t>
+            </a:r>
+            <a:r>
+              <a:rPr lang="en-US" altLang="en-US"/>
+              <a:t>(true)</a:t>
+            </a:r>
+            <a:endParaRPr lang="en-US" altLang="en-US"/>
+          </a:p>
+          <a:p>
+            <a:pPr lvl="1"/>
+            <a:endParaRPr lang="en-US" altLang="en-US"/>
+          </a:p>
+          <a:p>
+            <a:pPr lvl="0"/>
+            <a:endParaRPr lang="en-US" altLang="en-US"/>
+          </a:p>
+        </p:txBody>
+      </p:sp>
+    </p:spTree>
+  </p:cSld>
+  <p:clrMapOvr>
+    <a:masterClrMapping/>
+  </p:clrMapOvr>
+</p:sld>
+</file>
+
+<file path=ppt/slides/slide6.xml><?xml version="1.0" encoding="utf-8"?>
+<p:sld xmlns:a="http://schemas.openxmlformats.org/drawingml/2006/main" xmlns:r="http://schemas.openxmlformats.org/officeDocument/2006/relationships" xmlns:p="http://schemas.openxmlformats.org/presentationml/2006/main">
+  <p:cSld>
+    <p:spTree>
+      <p:nvGrpSpPr>
+        <p:cNvPr id="1" name=""/>
+        <p:cNvGrpSpPr/>
+        <p:nvPr/>
+      </p:nvGrpSpPr>
+      <p:grpSpPr/>
+      <p:sp>
+        <p:nvSpPr>
+          <p:cNvPr id="2" name="Title 1"/>
+          <p:cNvSpPr>
+            <a:spLocks noGrp="1"/>
+          </p:cNvSpPr>
+          <p:nvPr>
+            <p:ph type="title"/>
+          </p:nvPr>
+        </p:nvSpPr>
+        <p:spPr/>
+        <p:txBody>
+          <a:bodyPr/>
+          <a:p>
+            <a:r>
+              <a:rPr lang="en-US"/>
+              <a:t>Kopīgās funkcijas</a:t>
+            </a:r>
+            <a:endParaRPr lang="en-US"/>
+          </a:p>
+        </p:txBody>
+      </p:sp>
+      <p:sp>
+        <p:nvSpPr>
+          <p:cNvPr id="3" name="Content Placeholder 2"/>
+          <p:cNvSpPr>
+            <a:spLocks noGrp="1"/>
+          </p:cNvSpPr>
+          <p:nvPr>
+            <p:ph idx="1"/>
+          </p:nvPr>
+        </p:nvSpPr>
+        <p:spPr/>
+        <p:txBody>
+          <a:bodyPr/>
+          <a:p>
+            <a:r>
+              <a:rPr lang="en-US" altLang="en-US"/>
+              <a:t>.toUpperCase('a')</a:t>
+            </a:r>
+            <a:endParaRPr lang="en-US" altLang="en-US"/>
+          </a:p>
+          <a:p>
+            <a:pPr lvl="1"/>
+            <a:r>
+              <a:rPr lang="en-US" altLang="en-US" sz="2400"/>
+              <a:t>Pārveido doto vērtību uz lielajiem burtiem</a:t>
+            </a:r>
+            <a:endParaRPr lang="en-US" altLang="en-US" sz="2400"/>
+          </a:p>
+          <a:p>
+            <a:pPr lvl="2"/>
+            <a:r>
+              <a:rPr lang="en-US" altLang="en-US" sz="2000"/>
+              <a:t>Atbildes formāts (‘A’)</a:t>
+            </a:r>
+            <a:endParaRPr lang="en-US" altLang="en-US"/>
+          </a:p>
+          <a:p>
+            <a:r>
+              <a:rPr lang="en-US" altLang="en-US"/>
+              <a:t>.toLowerCase('A')</a:t>
+            </a:r>
+            <a:endParaRPr lang="en-US" altLang="en-US"/>
+          </a:p>
+          <a:p>
+            <a:pPr lvl="1"/>
+            <a:r>
+              <a:rPr lang="en-US" altLang="en-US"/>
+              <a:t>Pārvēido doto vērtību uz mazajiem burtiem</a:t>
+            </a:r>
+            <a:endParaRPr lang="en-US" altLang="en-US"/>
+          </a:p>
+          <a:p>
+            <a:pPr lvl="2"/>
+            <a:r>
+              <a:rPr lang="en-US" altLang="en-US"/>
+              <a:t>Atbildes formāts (‘a’)</a:t>
+            </a:r>
+            <a:endParaRPr lang="en-US" altLang="en-US"/>
+          </a:p>
+          <a:p>
+            <a:pPr lvl="0"/>
+            <a:r>
+              <a:rPr lang="en-US" altLang="en-US" sz="2800">
+                <a:sym typeface="+mn-ea"/>
+              </a:rPr>
+              <a:t>.compareTo("b")</a:t>
+            </a:r>
+            <a:endParaRPr lang="en-US" altLang="en-US" sz="2800"/>
+          </a:p>
+          <a:p>
+            <a:pPr lvl="1"/>
+            <a:r>
+              <a:rPr lang="en-US" altLang="en-US">
+                <a:sym typeface="+mn-ea"/>
+              </a:rPr>
+              <a:t>Salīdzina simbolus pēc Unicode vērtībām</a:t>
+            </a:r>
+            <a:endParaRPr lang="en-US" altLang="en-US"/>
+          </a:p>
+          <a:p>
+            <a:pPr lvl="2"/>
+            <a:r>
+              <a:rPr lang="en-US" altLang="en-US">
+                <a:sym typeface="+mn-ea"/>
+              </a:rPr>
+              <a:t>Atbildes formāts (-1)</a:t>
+            </a:r>
+            <a:endParaRPr lang="en-US" altLang="en-US"/>
+          </a:p>
+          <a:p>
+            <a:pPr lvl="0"/>
+            <a:endParaRPr lang="en-US" altLang="en-US"/>
+          </a:p>
+          <a:p>
+            <a:pPr lvl="2"/>
+            <a:endParaRPr lang="en-US" altLang="en-US"/>
+          </a:p>
+        </p:txBody>
+      </p:sp>
+    </p:spTree>
+  </p:cSld>
+  <p:clrMapOvr>
+    <a:masterClrMapping/>
+  </p:clrMapOvr>
+</p:sld>
+</file>
+
+<file path=ppt/slides/slide7.xml><?xml version="1.0" encoding="utf-8"?>
+<p:sld xmlns:a="http://schemas.openxmlformats.org/drawingml/2006/main" xmlns:r="http://schemas.openxmlformats.org/officeDocument/2006/relationships" xmlns:p="http://schemas.openxmlformats.org/presentationml/2006/main">
+  <p:cSld>
+    <p:spTree>
+      <p:nvGrpSpPr>
+        <p:cNvPr id="1" name=""/>
+        <p:cNvGrpSpPr/>
+        <p:nvPr/>
+      </p:nvGrpSpPr>
+      <p:grpSpPr/>
+      <p:sp>
+        <p:nvSpPr>
+          <p:cNvPr id="2" name="Title 1"/>
+          <p:cNvSpPr>
+            <a:spLocks noGrp="1"/>
+          </p:cNvSpPr>
+          <p:nvPr>
+            <p:ph type="title"/>
+          </p:nvPr>
+        </p:nvSpPr>
+        <p:spPr/>
+        <p:txBody>
+          <a:bodyPr/>
+          <a:p>
+            <a:r>
+              <a:rPr lang="en-US"/>
+              <a:t>Funkciju piemēri</a:t>
+            </a:r>
+            <a:endParaRPr lang="en-US"/>
+          </a:p>
+        </p:txBody>
+      </p:sp>
+      <p:sp>
+        <p:nvSpPr>
+          <p:cNvPr id="3" name="Content Placeholder 2"/>
+          <p:cNvSpPr>
+            <a:spLocks noGrp="1"/>
+          </p:cNvSpPr>
+          <p:nvPr>
+            <p:ph idx="1"/>
+          </p:nvPr>
+        </p:nvSpPr>
+        <p:spPr/>
+        <p:txBody>
+          <a:bodyPr/>
+          <a:p>
+            <a:r>
+              <a:rPr lang="en-US"/>
+              <a:t>isLetter un isDigit</a:t>
+            </a:r>
+            <a:endParaRPr lang="en-US"/>
+          </a:p>
+        </p:txBody>
+      </p:sp>
+      <p:pic>
+        <p:nvPicPr>
+          <p:cNvPr id="5" name="Picture 4"/>
+          <p:cNvPicPr>
+            <a:picLocks noChangeAspect="1"/>
+          </p:cNvPicPr>
+          <p:nvPr/>
+        </p:nvPicPr>
+        <p:blipFill>
+          <a:blip r:embed="rId1"/>
+          <a:stretch>
+            <a:fillRect/>
+          </a:stretch>
+        </p:blipFill>
+        <p:spPr>
+          <a:xfrm>
+            <a:off x="1109980" y="2393315"/>
+            <a:ext cx="4676775" cy="1752600"/>
+          </a:xfrm>
+          <a:prstGeom prst="rect">
+            <a:avLst/>
+          </a:prstGeom>
+        </p:spPr>
+      </p:pic>
+      <p:pic>
+        <p:nvPicPr>
+          <p:cNvPr id="7" name="Picture 6"/>
+          <p:cNvPicPr>
+            <a:picLocks noChangeAspect="1"/>
+          </p:cNvPicPr>
+          <p:nvPr/>
+        </p:nvPicPr>
+        <p:blipFill>
+          <a:blip r:embed="rId2"/>
+          <a:stretch>
+            <a:fillRect/>
+          </a:stretch>
+        </p:blipFill>
+        <p:spPr>
+          <a:xfrm>
+            <a:off x="1109980" y="4321175"/>
+            <a:ext cx="4467225" cy="2000250"/>
+          </a:xfrm>
+          <a:prstGeom prst="rect">
+            <a:avLst/>
+          </a:prstGeom>
+        </p:spPr>
+      </p:pic>
+      <p:sp>
+        <p:nvSpPr>
+          <p:cNvPr id="9" name="Text Box 8"/>
+          <p:cNvSpPr txBox="1"/>
+          <p:nvPr/>
+        </p:nvSpPr>
+        <p:spPr>
+          <a:xfrm>
+            <a:off x="6501765" y="2393315"/>
+            <a:ext cx="1403350" cy="922020"/>
+          </a:xfrm>
+          <a:prstGeom prst="rect">
+            <a:avLst/>
+          </a:prstGeom>
+          <a:noFill/>
+        </p:spPr>
+        <p:txBody>
+          <a:bodyPr wrap="square" rtlCol="0">
+            <a:spAutoFit/>
+          </a:bodyPr>
+          <a:p>
+            <a:r>
+              <a:rPr lang="en-US"/>
+              <a:t>Izvade:</a:t>
+            </a:r>
+            <a:endParaRPr lang="en-US"/>
+          </a:p>
+          <a:p>
+            <a:r>
+              <a:rPr lang="en-US"/>
+              <a:t>true</a:t>
+            </a:r>
+            <a:endParaRPr lang="en-US"/>
+          </a:p>
+          <a:p>
+            <a:r>
+              <a:rPr lang="en-US"/>
+              <a:t>false</a:t>
+            </a:r>
+            <a:endParaRPr lang="en-US"/>
+          </a:p>
+        </p:txBody>
+      </p:sp>
+      <p:sp>
+        <p:nvSpPr>
+          <p:cNvPr id="10" name="Text Box 9"/>
+          <p:cNvSpPr txBox="1"/>
+          <p:nvPr/>
+        </p:nvSpPr>
+        <p:spPr>
+          <a:xfrm>
+            <a:off x="6501765" y="4321175"/>
+            <a:ext cx="1403350" cy="922020"/>
+          </a:xfrm>
+          <a:prstGeom prst="rect">
+            <a:avLst/>
+          </a:prstGeom>
+          <a:noFill/>
+        </p:spPr>
+        <p:txBody>
+          <a:bodyPr wrap="square" rtlCol="0">
+            <a:spAutoFit/>
+          </a:bodyPr>
+          <a:p>
+            <a:r>
+              <a:rPr lang="en-US"/>
+              <a:t>Izvade:</a:t>
+            </a:r>
+            <a:endParaRPr lang="en-US"/>
+          </a:p>
+          <a:p>
+            <a:r>
+              <a:rPr lang="en-US"/>
+              <a:t>false</a:t>
+            </a:r>
+            <a:endParaRPr lang="en-US"/>
+          </a:p>
+          <a:p>
+            <a:r>
+              <a:rPr lang="en-US"/>
+              <a:t>true</a:t>
+            </a:r>
+            <a:endParaRPr lang="en-US"/>
+          </a:p>
+        </p:txBody>
+      </p:sp>
+    </p:spTree>
+  </p:cSld>
+  <p:clrMapOvr>
+    <a:masterClrMapping/>
+  </p:clrMapOvr>
+</p:sld>
+</file>
+
+<file path=ppt/slides/slide8.xml><?xml version="1.0" encoding="utf-8"?>
+<p:sld xmlns:a="http://schemas.openxmlformats.org/drawingml/2006/main" xmlns:r="http://schemas.openxmlformats.org/officeDocument/2006/relationships" xmlns:p="http://schemas.openxmlformats.org/presentationml/2006/main">
+  <p:cSld>
+    <p:spTree>
+      <p:nvGrpSpPr>
+        <p:cNvPr id="1" name=""/>
+        <p:cNvGrpSpPr/>
+        <p:nvPr/>
+      </p:nvGrpSpPr>
+      <p:grpSpPr/>
+      <p:sp>
+        <p:nvSpPr>
+          <p:cNvPr id="2" name="Title 1"/>
+          <p:cNvSpPr>
+            <a:spLocks noGrp="1"/>
+          </p:cNvSpPr>
+          <p:nvPr>
+            <p:ph type="title"/>
+          </p:nvPr>
+        </p:nvSpPr>
+        <p:spPr/>
+        <p:txBody>
+          <a:bodyPr/>
+          <a:p>
+            <a:r>
+              <a:rPr lang="en-US"/>
+              <a:t>Funkciju piemēri</a:t>
+            </a:r>
+            <a:endParaRPr lang="en-US"/>
+          </a:p>
+        </p:txBody>
+      </p:sp>
+      <p:sp>
+        <p:nvSpPr>
+          <p:cNvPr id="3" name="Content Placeholder 2"/>
+          <p:cNvSpPr>
+            <a:spLocks noGrp="1"/>
+          </p:cNvSpPr>
+          <p:nvPr>
+            <p:ph idx="1"/>
+          </p:nvPr>
+        </p:nvSpPr>
+        <p:spPr/>
+        <p:txBody>
+          <a:bodyPr/>
+          <a:p>
+            <a:r>
+              <a:rPr lang="en-US"/>
+              <a:t>isWhitespace un compareTo</a:t>
+            </a:r>
+            <a:endParaRPr lang="en-US"/>
+          </a:p>
+        </p:txBody>
+      </p:sp>
+      <p:pic>
+        <p:nvPicPr>
+          <p:cNvPr id="5" name="Picture 4"/>
+          <p:cNvPicPr>
+            <a:picLocks noChangeAspect="1"/>
+          </p:cNvPicPr>
+          <p:nvPr/>
+        </p:nvPicPr>
+        <p:blipFill>
+          <a:blip r:embed="rId1"/>
+          <a:stretch>
+            <a:fillRect/>
+          </a:stretch>
+        </p:blipFill>
+        <p:spPr>
+          <a:xfrm>
+            <a:off x="838200" y="5078730"/>
+            <a:ext cx="3924300" cy="1323975"/>
+          </a:xfrm>
+          <a:prstGeom prst="rect">
+            <a:avLst/>
+          </a:prstGeom>
+        </p:spPr>
+      </p:pic>
+      <p:pic>
+        <p:nvPicPr>
+          <p:cNvPr id="6" name="Picture 5"/>
+          <p:cNvPicPr>
+            <a:picLocks noChangeAspect="1"/>
+          </p:cNvPicPr>
+          <p:nvPr/>
+        </p:nvPicPr>
+        <p:blipFill>
+          <a:blip r:embed="rId2"/>
+          <a:stretch>
+            <a:fillRect/>
+          </a:stretch>
+        </p:blipFill>
+        <p:spPr>
+          <a:xfrm>
+            <a:off x="838200" y="2458085"/>
+            <a:ext cx="4762500" cy="2076450"/>
+          </a:xfrm>
+          <a:prstGeom prst="rect">
+            <a:avLst/>
+          </a:prstGeom>
+        </p:spPr>
+      </p:pic>
+      <p:sp>
+        <p:nvSpPr>
+          <p:cNvPr id="10" name="Text Box 9"/>
+          <p:cNvSpPr txBox="1"/>
+          <p:nvPr/>
+        </p:nvSpPr>
+        <p:spPr>
+          <a:xfrm>
+            <a:off x="6319520" y="2458085"/>
+            <a:ext cx="1403350" cy="1476375"/>
+          </a:xfrm>
+          <a:prstGeom prst="rect">
+            <a:avLst/>
+          </a:prstGeom>
+          <a:noFill/>
+        </p:spPr>
+        <p:txBody>
+          <a:bodyPr wrap="square" rtlCol="0">
+            <a:spAutoFit/>
+          </a:bodyPr>
+          <a:p>
+            <a:r>
+              <a:rPr lang="en-US"/>
+              <a:t>Izvade:</a:t>
+            </a:r>
+            <a:endParaRPr lang="en-US"/>
+          </a:p>
+          <a:p>
+            <a:r>
+              <a:rPr lang="en-US"/>
+              <a:t>false</a:t>
+            </a:r>
+            <a:endParaRPr lang="en-US"/>
+          </a:p>
+          <a:p>
+            <a:r>
+              <a:rPr lang="en-US"/>
+              <a:t>true</a:t>
+            </a:r>
+            <a:endParaRPr lang="en-US"/>
+          </a:p>
+          <a:p>
+            <a:r>
+              <a:rPr lang="en-US"/>
+              <a:t>true</a:t>
+            </a:r>
+            <a:endParaRPr lang="en-US"/>
+          </a:p>
+          <a:p>
+            <a:r>
+              <a:rPr lang="en-US"/>
+              <a:t>true</a:t>
+            </a:r>
+            <a:endParaRPr lang="en-US"/>
+          </a:p>
+        </p:txBody>
+      </p:sp>
+      <p:sp>
+        <p:nvSpPr>
+          <p:cNvPr id="9" name="Text Box 8"/>
+          <p:cNvSpPr txBox="1"/>
+          <p:nvPr/>
+        </p:nvSpPr>
+        <p:spPr>
+          <a:xfrm>
+            <a:off x="6319520" y="5078730"/>
+            <a:ext cx="1403350" cy="645160"/>
+          </a:xfrm>
+          <a:prstGeom prst="rect">
+            <a:avLst/>
+          </a:prstGeom>
+          <a:noFill/>
+        </p:spPr>
+        <p:txBody>
+          <a:bodyPr wrap="square" rtlCol="0">
+            <a:spAutoFit/>
+          </a:bodyPr>
+          <a:p>
+            <a:r>
+              <a:rPr lang="en-US"/>
+              <a:t>Izvade:</a:t>
+            </a:r>
+            <a:endParaRPr lang="en-US"/>
+          </a:p>
+          <a:p>
+            <a:r>
+              <a:rPr lang="en-US"/>
+              <a:t>0</a:t>
+            </a:r>
+            <a:endParaRPr lang="en-US"/>
+          </a:p>
+        </p:txBody>
+      </p:sp>
+    </p:spTree>
+  </p:cSld>
+  <p:clrMapOvr>
+    <a:masterClrMapping/>
+  </p:clrMapOvr>
+</p:sld>
+</file>
+
+<file path=ppt/slides/slide9.xml><?xml version="1.0" encoding="utf-8"?>
+<p:sld xmlns:a="http://schemas.openxmlformats.org/drawingml/2006/main" xmlns:r="http://schemas.openxmlformats.org/officeDocument/2006/relationships" xmlns:p="http://schemas.openxmlformats.org/presentationml/2006/main">
+  <p:cSld>
+    <p:spTree>
+      <p:nvGrpSpPr>
+        <p:cNvPr id="1" name=""/>
+        <p:cNvGrpSpPr/>
+        <p:nvPr/>
+      </p:nvGrpSpPr>
+      <p:grpSpPr/>
+      <p:sp>
+        <p:nvSpPr>
+          <p:cNvPr id="2" name="Title 1"/>
+          <p:cNvSpPr>
+            <a:spLocks noGrp="1"/>
+          </p:cNvSpPr>
+          <p:nvPr>
+            <p:ph type="title"/>
+          </p:nvPr>
+        </p:nvSpPr>
+        <p:spPr/>
+        <p:txBody>
+          <a:bodyPr/>
+          <a:p>
+            <a:r>
+              <a:rPr lang="en-US"/>
+              <a:t>Funkciju piemēri</a:t>
+            </a:r>
+            <a:endParaRPr lang="en-US"/>
+          </a:p>
+        </p:txBody>
+      </p:sp>
+      <p:sp>
+        <p:nvSpPr>
+          <p:cNvPr id="3" name="Content Placeholder 2"/>
+          <p:cNvSpPr>
+            <a:spLocks noGrp="1"/>
+          </p:cNvSpPr>
+          <p:nvPr>
+            <p:ph idx="1"/>
+          </p:nvPr>
+        </p:nvSpPr>
+        <p:spPr/>
+        <p:txBody>
+          <a:bodyPr/>
+          <a:p>
+            <a:r>
+              <a:rPr lang="en-US"/>
+              <a:t>length un charAt</a:t>
+            </a:r>
+            <a:endParaRPr lang="en-US"/>
+          </a:p>
+        </p:txBody>
+      </p:sp>
+      <p:pic>
+        <p:nvPicPr>
+          <p:cNvPr id="4" name="Picture 3"/>
+          <p:cNvPicPr>
+            <a:picLocks noChangeAspect="1"/>
+          </p:cNvPicPr>
+          <p:nvPr/>
+        </p:nvPicPr>
+        <p:blipFill>
+          <a:blip r:embed="rId1"/>
+          <a:stretch>
+            <a:fillRect/>
+          </a:stretch>
+        </p:blipFill>
+        <p:spPr>
+          <a:xfrm>
+            <a:off x="910590" y="2371725"/>
+            <a:ext cx="3743325" cy="1057275"/>
+          </a:xfrm>
+          <a:prstGeom prst="rect">
+            <a:avLst/>
+          </a:prstGeom>
+        </p:spPr>
+      </p:pic>
+      <p:pic>
+        <p:nvPicPr>
+          <p:cNvPr id="7" name="Picture 6"/>
+          <p:cNvPicPr>
+            <a:picLocks noChangeAspect="1"/>
+          </p:cNvPicPr>
+          <p:nvPr/>
+        </p:nvPicPr>
+        <p:blipFill>
+          <a:blip r:embed="rId2"/>
+          <a:stretch>
+            <a:fillRect/>
+          </a:stretch>
+        </p:blipFill>
+        <p:spPr>
+          <a:xfrm>
+            <a:off x="910590" y="4235450"/>
+            <a:ext cx="3429000" cy="1228725"/>
+          </a:xfrm>
+          <a:prstGeom prst="rect">
+            <a:avLst/>
+          </a:prstGeom>
+        </p:spPr>
+      </p:pic>
+      <p:sp>
+        <p:nvSpPr>
+          <p:cNvPr id="10" name="Text Box 9"/>
+          <p:cNvSpPr txBox="1"/>
+          <p:nvPr/>
+        </p:nvSpPr>
+        <p:spPr>
+          <a:xfrm>
+            <a:off x="5256530" y="2371725"/>
+            <a:ext cx="1403350" cy="645160"/>
+          </a:xfrm>
+          <a:prstGeom prst="rect">
+            <a:avLst/>
+          </a:prstGeom>
+          <a:noFill/>
+        </p:spPr>
+        <p:txBody>
+          <a:bodyPr wrap="square" rtlCol="0">
+            <a:spAutoFit/>
+          </a:bodyPr>
+          <a:p>
+            <a:r>
+              <a:rPr lang="en-US"/>
+              <a:t>Izvade:</a:t>
+            </a:r>
+            <a:endParaRPr lang="en-US"/>
+          </a:p>
+          <a:p>
+            <a:r>
+              <a:rPr lang="en-US"/>
+              <a:t>26</a:t>
+            </a:r>
+            <a:endParaRPr lang="en-US"/>
+          </a:p>
+        </p:txBody>
+      </p:sp>
+      <p:sp>
+        <p:nvSpPr>
+          <p:cNvPr id="9" name="Text Box 8"/>
+          <p:cNvSpPr txBox="1"/>
+          <p:nvPr/>
+        </p:nvSpPr>
+        <p:spPr>
+          <a:xfrm>
+            <a:off x="5256530" y="4235450"/>
+            <a:ext cx="1403350" cy="645160"/>
+          </a:xfrm>
+          <a:prstGeom prst="rect">
+            <a:avLst/>
+          </a:prstGeom>
+          <a:noFill/>
+        </p:spPr>
+        <p:txBody>
+          <a:bodyPr wrap="square" rtlCol="0">
+            <a:spAutoFit/>
+          </a:bodyPr>
+          <a:p>
+            <a:r>
+              <a:rPr lang="en-US"/>
+              <a:t>Izvade:</a:t>
+            </a:r>
+            <a:endParaRPr lang="en-US"/>
+          </a:p>
+          <a:p>
+            <a:r>
+              <a:rPr lang="en-US"/>
+              <a:t>H</a:t>
+            </a:r>
             <a:endParaRPr lang="en-US"/>
           </a:p>
         </p:txBody>

</xml_diff>

<commit_message>
Pievienots pirmā uzdevuma piemēra apraksts un rezultāts, un īstenots java programmā
</commit_message>
<xml_diff>
--- a/MacibuMaterialsProgEks.pptx
+++ b/MacibuMaterialsProgEks.pptx
@@ -5,7 +5,7 @@
     <p:sldMasterId id="2147483648" r:id="rId1"/>
   </p:sldMasterIdLst>
   <p:handoutMasterIdLst>
-    <p:handoutMasterId r:id="rId14"/>
+    <p:handoutMasterId r:id="rId16"/>
   </p:handoutMasterIdLst>
   <p:sldIdLst>
     <p:sldId id="256" r:id="rId3"/>
@@ -19,6 +19,8 @@
     <p:sldId id="264" r:id="rId11"/>
     <p:sldId id="265" r:id="rId12"/>
     <p:sldId id="266" r:id="rId13"/>
+    <p:sldId id="267" r:id="rId14"/>
+    <p:sldId id="268" r:id="rId15"/>
   </p:sldIdLst>
   <p:sldSz cx="12192000" cy="6858000"/>
   <p:notesSz cx="6858000" cy="9144000"/>
@@ -3636,6 +3638,134 @@
 </p:sld>
 </file>
 
+<file path=ppt/slides/slide12.xml><?xml version="1.0" encoding="utf-8"?>
+<p:sld xmlns:a="http://schemas.openxmlformats.org/drawingml/2006/main" xmlns:r="http://schemas.openxmlformats.org/officeDocument/2006/relationships" xmlns:p="http://schemas.openxmlformats.org/presentationml/2006/main">
+  <p:cSld>
+    <p:spTree>
+      <p:nvGrpSpPr>
+        <p:cNvPr id="1" name=""/>
+        <p:cNvGrpSpPr/>
+        <p:nvPr/>
+      </p:nvGrpSpPr>
+      <p:grpSpPr/>
+      <p:sp>
+        <p:nvSpPr>
+          <p:cNvPr id="2" name="Title 1"/>
+          <p:cNvSpPr>
+            <a:spLocks noGrp="1"/>
+          </p:cNvSpPr>
+          <p:nvPr>
+            <p:ph type="title"/>
+          </p:nvPr>
+        </p:nvSpPr>
+        <p:spPr/>
+        <p:txBody>
+          <a:bodyPr/>
+          <a:p>
+            <a:r>
+              <a:rPr lang="en-US"/>
+              <a:t>1. Praktiskais uzdevums</a:t>
+            </a:r>
+            <a:endParaRPr lang="en-US"/>
+          </a:p>
+        </p:txBody>
+      </p:sp>
+      <p:sp>
+        <p:nvSpPr>
+          <p:cNvPr id="3" name="Content Placeholder 2"/>
+          <p:cNvSpPr>
+            <a:spLocks noGrp="1"/>
+          </p:cNvSpPr>
+          <p:nvPr>
+            <p:ph idx="1"/>
+          </p:nvPr>
+        </p:nvSpPr>
+        <p:spPr/>
+        <p:txBody>
+          <a:bodyPr/>
+          <a:p>
+            <a:r>
+              <a:rPr lang="en-US" altLang="en-US"/>
+              <a:t>Izstrādā programmu kas prasa lietotājam ievadīt vienu simbolu, nosaka vai simbols ir burts vai cipars, ja tas ir burts pārbauda vai lielais vai mazais un izvada atbildi, ja tas ir cipars izvada ka tas ir cipars un ja tas nav ne burts ne cipars tad izvada ka tas ir speciālais simbols.</a:t>
+            </a:r>
+            <a:endParaRPr lang="en-US" altLang="en-US"/>
+          </a:p>
+        </p:txBody>
+      </p:sp>
+    </p:spTree>
+  </p:cSld>
+  <p:clrMapOvr>
+    <a:masterClrMapping/>
+  </p:clrMapOvr>
+</p:sld>
+</file>
+
+<file path=ppt/slides/slide13.xml><?xml version="1.0" encoding="utf-8"?>
+<p:sld xmlns:a="http://schemas.openxmlformats.org/drawingml/2006/main" xmlns:r="http://schemas.openxmlformats.org/officeDocument/2006/relationships" xmlns:p="http://schemas.openxmlformats.org/presentationml/2006/main">
+  <p:cSld>
+    <p:spTree>
+      <p:nvGrpSpPr>
+        <p:cNvPr id="1" name=""/>
+        <p:cNvGrpSpPr/>
+        <p:nvPr/>
+      </p:nvGrpSpPr>
+      <p:grpSpPr/>
+      <p:sp>
+        <p:nvSpPr>
+          <p:cNvPr id="2" name="Title 1"/>
+          <p:cNvSpPr>
+            <a:spLocks noGrp="1"/>
+          </p:cNvSpPr>
+          <p:nvPr>
+            <p:ph type="title"/>
+          </p:nvPr>
+        </p:nvSpPr>
+        <p:spPr/>
+        <p:txBody>
+          <a:bodyPr/>
+          <a:p>
+            <a:r>
+              <a:rPr lang="en-US"/>
+              <a:t>1. Uzdevuma rezultāts</a:t>
+            </a:r>
+            <a:endParaRPr lang="en-US"/>
+          </a:p>
+        </p:txBody>
+      </p:sp>
+      <p:pic>
+        <p:nvPicPr>
+          <p:cNvPr id="4" name="Content Placeholder 3"/>
+          <p:cNvPicPr>
+            <a:picLocks noChangeAspect="1"/>
+          </p:cNvPicPr>
+          <p:nvPr>
+            <p:ph idx="1"/>
+          </p:nvPr>
+        </p:nvPicPr>
+        <p:blipFill>
+          <a:blip r:embed="rId1"/>
+          <a:stretch>
+            <a:fillRect/>
+          </a:stretch>
+        </p:blipFill>
+        <p:spPr>
+          <a:xfrm>
+            <a:off x="838200" y="1691005"/>
+            <a:ext cx="4514850" cy="4528820"/>
+          </a:xfrm>
+          <a:prstGeom prst="rect">
+            <a:avLst/>
+          </a:prstGeom>
+        </p:spPr>
+      </p:pic>
+    </p:spTree>
+  </p:cSld>
+  <p:clrMapOvr>
+    <a:masterClrMapping/>
+  </p:clrMapOvr>
+</p:sld>
+</file>
+
 <file path=ppt/slides/slide2.xml><?xml version="1.0" encoding="utf-8"?>
 <p:sld xmlns:a="http://schemas.openxmlformats.org/drawingml/2006/main" xmlns:r="http://schemas.openxmlformats.org/officeDocument/2006/relationships" xmlns:p="http://schemas.openxmlformats.org/presentationml/2006/main">
   <p:cSld>
@@ -3687,7 +3817,7 @@
               <a:t>Datu tips "char" tiek izmantots vienas rakstzīmes glabā</a:t>
             </a:r>
             <a:r>
-              <a:rPr lang="" altLang="en-US"/>
+              <a:rPr lang="en-US" altLang="en-US"/>
               <a:t>š</a:t>
             </a:r>
             <a:r>
@@ -3695,7 +3825,7 @@
               <a:t>anai. Rakstzīmei jābūt ietvertai vienpēdi</a:t>
             </a:r>
             <a:r>
-              <a:rPr lang="" altLang="en-US"/>
+              <a:rPr lang="en-US" altLang="en-US"/>
               <a:t>ņ</a:t>
             </a:r>
             <a:r>
@@ -3842,7 +3972,7 @@
               <a:t>Virknes mainīgais satur rakstzīmju kopu, kas ietverta pēdi</a:t>
             </a:r>
             <a:r>
-              <a:rPr lang="" altLang="en-US"/>
+              <a:rPr lang="en-US" altLang="en-US"/>
               <a:t>ņ</a:t>
             </a:r>
             <a:r>
@@ -4235,7 +4365,7 @@
               <a:t>Salīdzina divas virknes ignorējot lielo un mazo burtu at</a:t>
             </a:r>
             <a:r>
-              <a:rPr lang="" altLang="en-US"/>
+              <a:rPr lang="en-US" altLang="en-US"/>
               <a:t>šķ</a:t>
             </a:r>
             <a:r>

</xml_diff>

<commit_message>
Izveidots 2. uzdevuma apraksts un izveidota java programma
</commit_message>
<xml_diff>
--- a/MacibuMaterialsProgEks.pptx
+++ b/MacibuMaterialsProgEks.pptx
@@ -5,7 +5,7 @@
     <p:sldMasterId id="2147483648" r:id="rId1"/>
   </p:sldMasterIdLst>
   <p:handoutMasterIdLst>
-    <p:handoutMasterId r:id="rId16"/>
+    <p:handoutMasterId r:id="rId20"/>
   </p:handoutMasterIdLst>
   <p:sldIdLst>
     <p:sldId id="256" r:id="rId3"/>
@@ -21,6 +21,10 @@
     <p:sldId id="266" r:id="rId13"/>
     <p:sldId id="267" r:id="rId14"/>
     <p:sldId id="268" r:id="rId15"/>
+    <p:sldId id="269" r:id="rId16"/>
+    <p:sldId id="270" r:id="rId17"/>
+    <p:sldId id="271" r:id="rId18"/>
+    <p:sldId id="272" r:id="rId19"/>
   </p:sldIdLst>
   <p:sldSz cx="12192000" cy="6858000"/>
   <p:notesSz cx="6858000" cy="9144000"/>
@@ -3758,6 +3762,460 @@
           </a:prstGeom>
         </p:spPr>
       </p:pic>
+      <p:pic>
+        <p:nvPicPr>
+          <p:cNvPr id="3" name="Picture 2"/>
+          <p:cNvPicPr>
+            <a:picLocks noChangeAspect="1"/>
+          </p:cNvPicPr>
+          <p:nvPr/>
+        </p:nvPicPr>
+        <p:blipFill>
+          <a:blip r:embed="rId2"/>
+          <a:stretch>
+            <a:fillRect/>
+          </a:stretch>
+        </p:blipFill>
+        <p:spPr>
+          <a:xfrm>
+            <a:off x="5448300" y="3427095"/>
+            <a:ext cx="2076450" cy="619125"/>
+          </a:xfrm>
+          <a:prstGeom prst="rect">
+            <a:avLst/>
+          </a:prstGeom>
+        </p:spPr>
+      </p:pic>
+      <p:pic>
+        <p:nvPicPr>
+          <p:cNvPr id="5" name="Picture 4"/>
+          <p:cNvPicPr>
+            <a:picLocks noChangeAspect="1"/>
+          </p:cNvPicPr>
+          <p:nvPr/>
+        </p:nvPicPr>
+        <p:blipFill>
+          <a:blip r:embed="rId3"/>
+          <a:stretch>
+            <a:fillRect/>
+          </a:stretch>
+        </p:blipFill>
+        <p:spPr>
+          <a:xfrm>
+            <a:off x="5448300" y="4180205"/>
+            <a:ext cx="2228850" cy="581025"/>
+          </a:xfrm>
+          <a:prstGeom prst="rect">
+            <a:avLst/>
+          </a:prstGeom>
+        </p:spPr>
+      </p:pic>
+      <p:pic>
+        <p:nvPicPr>
+          <p:cNvPr id="6" name="Picture 5"/>
+          <p:cNvPicPr>
+            <a:picLocks noChangeAspect="1"/>
+          </p:cNvPicPr>
+          <p:nvPr/>
+        </p:nvPicPr>
+        <p:blipFill>
+          <a:blip r:embed="rId4"/>
+          <a:stretch>
+            <a:fillRect/>
+          </a:stretch>
+        </p:blipFill>
+        <p:spPr>
+          <a:xfrm>
+            <a:off x="5448300" y="4895215"/>
+            <a:ext cx="2543175" cy="561975"/>
+          </a:xfrm>
+          <a:prstGeom prst="rect">
+            <a:avLst/>
+          </a:prstGeom>
+        </p:spPr>
+      </p:pic>
+      <p:pic>
+        <p:nvPicPr>
+          <p:cNvPr id="7" name="Picture 6"/>
+          <p:cNvPicPr>
+            <a:picLocks noChangeAspect="1"/>
+          </p:cNvPicPr>
+          <p:nvPr/>
+        </p:nvPicPr>
+        <p:blipFill>
+          <a:blip r:embed="rId5"/>
+          <a:stretch>
+            <a:fillRect/>
+          </a:stretch>
+        </p:blipFill>
+        <p:spPr>
+          <a:xfrm>
+            <a:off x="5448300" y="5591175"/>
+            <a:ext cx="2962275" cy="628650"/>
+          </a:xfrm>
+          <a:prstGeom prst="rect">
+            <a:avLst/>
+          </a:prstGeom>
+        </p:spPr>
+      </p:pic>
+      <p:sp>
+        <p:nvSpPr>
+          <p:cNvPr id="8" name="Text Box 7"/>
+          <p:cNvSpPr txBox="1"/>
+          <p:nvPr/>
+        </p:nvSpPr>
+        <p:spPr>
+          <a:xfrm>
+            <a:off x="5448300" y="2751455"/>
+            <a:ext cx="1146810" cy="368300"/>
+          </a:xfrm>
+          <a:prstGeom prst="rect">
+            <a:avLst/>
+          </a:prstGeom>
+          <a:noFill/>
+        </p:spPr>
+        <p:txBody>
+          <a:bodyPr wrap="square" rtlCol="0">
+            <a:spAutoFit/>
+          </a:bodyPr>
+          <a:p>
+            <a:r>
+              <a:rPr lang="en-US"/>
+              <a:t>Pārbaude:</a:t>
+            </a:r>
+            <a:endParaRPr lang="en-US"/>
+          </a:p>
+        </p:txBody>
+      </p:sp>
+    </p:spTree>
+  </p:cSld>
+  <p:clrMapOvr>
+    <a:masterClrMapping/>
+  </p:clrMapOvr>
+</p:sld>
+</file>
+
+<file path=ppt/slides/slide14.xml><?xml version="1.0" encoding="utf-8"?>
+<p:sld xmlns:a="http://schemas.openxmlformats.org/drawingml/2006/main" xmlns:r="http://schemas.openxmlformats.org/officeDocument/2006/relationships" xmlns:p="http://schemas.openxmlformats.org/presentationml/2006/main">
+  <p:cSld>
+    <p:spTree>
+      <p:nvGrpSpPr>
+        <p:cNvPr id="1" name=""/>
+        <p:cNvGrpSpPr/>
+        <p:nvPr/>
+      </p:nvGrpSpPr>
+      <p:grpSpPr/>
+      <p:sp>
+        <p:nvSpPr>
+          <p:cNvPr id="2" name="Title 1"/>
+          <p:cNvSpPr>
+            <a:spLocks noGrp="1"/>
+          </p:cNvSpPr>
+          <p:nvPr>
+            <p:ph type="title"/>
+          </p:nvPr>
+        </p:nvSpPr>
+        <p:spPr/>
+        <p:txBody>
+          <a:bodyPr/>
+          <a:p>
+            <a:r>
+              <a:rPr lang="en-US"/>
+              <a:t>2. Praktiskais uzdevums</a:t>
+            </a:r>
+            <a:endParaRPr lang="en-US"/>
+          </a:p>
+        </p:txBody>
+      </p:sp>
+      <p:sp>
+        <p:nvSpPr>
+          <p:cNvPr id="3" name="Content Placeholder 2"/>
+          <p:cNvSpPr>
+            <a:spLocks noGrp="1"/>
+          </p:cNvSpPr>
+          <p:nvPr>
+            <p:ph idx="1"/>
+          </p:nvPr>
+        </p:nvSpPr>
+        <p:spPr/>
+        <p:txBody>
+          <a:bodyPr/>
+          <a:p>
+            <a:r>
+              <a:rPr lang="en-US" altLang="en-US"/>
+              <a:t>Izstrādā programmu kas prasa lietotājam ievadīt divas simbolu virknes un savieno tās kopā, pārveido rezultātu uz lielajiem burtiem un to izvada un to pa</a:t>
+            </a:r>
+            <a:r>
+              <a:rPr lang="" altLang="en-US"/>
+              <a:t>š</a:t>
+            </a:r>
+            <a:r>
+              <a:rPr lang="en-US" altLang="en-US"/>
+              <a:t>u atkārtot ar mazajiem burtiem, pārbauda vai abi texti ir vienādi un nosaka savienotās simbolu virknes garumu. </a:t>
+            </a:r>
+            <a:endParaRPr lang="en-US" altLang="en-US"/>
+          </a:p>
+        </p:txBody>
+      </p:sp>
+    </p:spTree>
+  </p:cSld>
+  <p:clrMapOvr>
+    <a:masterClrMapping/>
+  </p:clrMapOvr>
+</p:sld>
+</file>
+
+<file path=ppt/slides/slide15.xml><?xml version="1.0" encoding="utf-8"?>
+<p:sld xmlns:a="http://schemas.openxmlformats.org/drawingml/2006/main" xmlns:r="http://schemas.openxmlformats.org/officeDocument/2006/relationships" xmlns:p="http://schemas.openxmlformats.org/presentationml/2006/main">
+  <p:cSld>
+    <p:spTree>
+      <p:nvGrpSpPr>
+        <p:cNvPr id="1" name=""/>
+        <p:cNvGrpSpPr/>
+        <p:nvPr/>
+      </p:nvGrpSpPr>
+      <p:grpSpPr/>
+      <p:sp>
+        <p:nvSpPr>
+          <p:cNvPr id="2" name="Title 1"/>
+          <p:cNvSpPr>
+            <a:spLocks noGrp="1"/>
+          </p:cNvSpPr>
+          <p:nvPr>
+            <p:ph type="title"/>
+          </p:nvPr>
+        </p:nvSpPr>
+        <p:spPr/>
+        <p:txBody>
+          <a:bodyPr/>
+          <a:p>
+            <a:r>
+              <a:rPr lang="en-US"/>
+              <a:t>2. Uzdevuma rezultāts</a:t>
+            </a:r>
+            <a:endParaRPr lang="en-US"/>
+          </a:p>
+        </p:txBody>
+      </p:sp>
+      <p:pic>
+        <p:nvPicPr>
+          <p:cNvPr id="5" name="Picture 4"/>
+          <p:cNvPicPr>
+            <a:picLocks noChangeAspect="1"/>
+          </p:cNvPicPr>
+          <p:nvPr/>
+        </p:nvPicPr>
+        <p:blipFill>
+          <a:blip r:embed="rId1"/>
+          <a:stretch>
+            <a:fillRect/>
+          </a:stretch>
+        </p:blipFill>
+        <p:spPr>
+          <a:xfrm>
+            <a:off x="8912225" y="2189480"/>
+            <a:ext cx="2914650" cy="1916430"/>
+          </a:xfrm>
+          <a:prstGeom prst="rect">
+            <a:avLst/>
+          </a:prstGeom>
+        </p:spPr>
+      </p:pic>
+      <p:pic>
+        <p:nvPicPr>
+          <p:cNvPr id="6" name="Picture 5"/>
+          <p:cNvPicPr>
+            <a:picLocks noChangeAspect="1"/>
+          </p:cNvPicPr>
+          <p:nvPr/>
+        </p:nvPicPr>
+        <p:blipFill>
+          <a:blip r:embed="rId2"/>
+          <a:stretch>
+            <a:fillRect/>
+          </a:stretch>
+        </p:blipFill>
+        <p:spPr>
+          <a:xfrm>
+            <a:off x="8912225" y="4220845"/>
+            <a:ext cx="2914015" cy="1894205"/>
+          </a:xfrm>
+          <a:prstGeom prst="rect">
+            <a:avLst/>
+          </a:prstGeom>
+        </p:spPr>
+      </p:pic>
+      <p:sp>
+        <p:nvSpPr>
+          <p:cNvPr id="8" name="Text Box 7"/>
+          <p:cNvSpPr txBox="1"/>
+          <p:nvPr/>
+        </p:nvSpPr>
+        <p:spPr>
+          <a:xfrm>
+            <a:off x="8912225" y="1634490"/>
+            <a:ext cx="1146810" cy="368300"/>
+          </a:xfrm>
+          <a:prstGeom prst="rect">
+            <a:avLst/>
+          </a:prstGeom>
+          <a:noFill/>
+        </p:spPr>
+        <p:txBody>
+          <a:bodyPr wrap="square" rtlCol="0">
+            <a:spAutoFit/>
+          </a:bodyPr>
+          <a:p>
+            <a:r>
+              <a:rPr lang="en-US"/>
+              <a:t>Pārbaude:</a:t>
+            </a:r>
+            <a:endParaRPr lang="en-US"/>
+          </a:p>
+        </p:txBody>
+      </p:sp>
+      <p:pic>
+        <p:nvPicPr>
+          <p:cNvPr id="9" name="Content Placeholder 8"/>
+          <p:cNvPicPr>
+            <a:picLocks noChangeAspect="1"/>
+          </p:cNvPicPr>
+          <p:nvPr>
+            <p:ph idx="1"/>
+          </p:nvPr>
+        </p:nvPicPr>
+        <p:blipFill>
+          <a:blip r:embed="rId3"/>
+          <a:stretch>
+            <a:fillRect/>
+          </a:stretch>
+        </p:blipFill>
+        <p:spPr>
+          <a:xfrm>
+            <a:off x="838200" y="1763395"/>
+            <a:ext cx="7883525" cy="4351655"/>
+          </a:xfrm>
+          <a:prstGeom prst="rect">
+            <a:avLst/>
+          </a:prstGeom>
+        </p:spPr>
+      </p:pic>
+    </p:spTree>
+  </p:cSld>
+  <p:clrMapOvr>
+    <a:masterClrMapping/>
+  </p:clrMapOvr>
+</p:sld>
+</file>
+
+<file path=ppt/slides/slide16.xml><?xml version="1.0" encoding="utf-8"?>
+<p:sld xmlns:a="http://schemas.openxmlformats.org/drawingml/2006/main" xmlns:r="http://schemas.openxmlformats.org/officeDocument/2006/relationships" xmlns:p="http://schemas.openxmlformats.org/presentationml/2006/main">
+  <p:cSld>
+    <p:spTree>
+      <p:nvGrpSpPr>
+        <p:cNvPr id="1" name=""/>
+        <p:cNvGrpSpPr/>
+        <p:nvPr/>
+      </p:nvGrpSpPr>
+      <p:grpSpPr/>
+      <p:sp>
+        <p:nvSpPr>
+          <p:cNvPr id="2" name="Title 1"/>
+          <p:cNvSpPr>
+            <a:spLocks noGrp="1"/>
+          </p:cNvSpPr>
+          <p:nvPr>
+            <p:ph type="title"/>
+          </p:nvPr>
+        </p:nvSpPr>
+        <p:spPr/>
+        <p:txBody>
+          <a:bodyPr/>
+          <a:p>
+            <a:r>
+              <a:rPr lang="en-US"/>
+              <a:t>3. Praktiskais uzdevums</a:t>
+            </a:r>
+            <a:endParaRPr lang="en-US"/>
+          </a:p>
+        </p:txBody>
+      </p:sp>
+      <p:sp>
+        <p:nvSpPr>
+          <p:cNvPr id="3" name="Content Placeholder 2"/>
+          <p:cNvSpPr>
+            <a:spLocks noGrp="1"/>
+          </p:cNvSpPr>
+          <p:nvPr>
+            <p:ph idx="1"/>
+          </p:nvPr>
+        </p:nvSpPr>
+        <p:spPr/>
+        <p:txBody>
+          <a:bodyPr/>
+          <a:p>
+            <a:endParaRPr lang="en-US"/>
+          </a:p>
+        </p:txBody>
+      </p:sp>
+    </p:spTree>
+  </p:cSld>
+  <p:clrMapOvr>
+    <a:masterClrMapping/>
+  </p:clrMapOvr>
+</p:sld>
+</file>
+
+<file path=ppt/slides/slide17.xml><?xml version="1.0" encoding="utf-8"?>
+<p:sld xmlns:a="http://schemas.openxmlformats.org/drawingml/2006/main" xmlns:r="http://schemas.openxmlformats.org/officeDocument/2006/relationships" xmlns:p="http://schemas.openxmlformats.org/presentationml/2006/main">
+  <p:cSld>
+    <p:spTree>
+      <p:nvGrpSpPr>
+        <p:cNvPr id="1" name=""/>
+        <p:cNvGrpSpPr/>
+        <p:nvPr/>
+      </p:nvGrpSpPr>
+      <p:grpSpPr/>
+      <p:sp>
+        <p:nvSpPr>
+          <p:cNvPr id="2" name="Title 1"/>
+          <p:cNvSpPr>
+            <a:spLocks noGrp="1"/>
+          </p:cNvSpPr>
+          <p:nvPr>
+            <p:ph type="title"/>
+          </p:nvPr>
+        </p:nvSpPr>
+        <p:spPr/>
+        <p:txBody>
+          <a:bodyPr/>
+          <a:p>
+            <a:r>
+              <a:rPr lang="en-US"/>
+              <a:t>3. Uzdevuma rezultāts</a:t>
+            </a:r>
+            <a:endParaRPr lang="en-US"/>
+          </a:p>
+        </p:txBody>
+      </p:sp>
+      <p:sp>
+        <p:nvSpPr>
+          <p:cNvPr id="3" name="Content Placeholder 2"/>
+          <p:cNvSpPr>
+            <a:spLocks noGrp="1"/>
+          </p:cNvSpPr>
+          <p:nvPr>
+            <p:ph idx="1"/>
+          </p:nvPr>
+        </p:nvSpPr>
+        <p:spPr/>
+        <p:txBody>
+          <a:bodyPr/>
+          <a:p>
+            <a:endParaRPr lang="en-US"/>
+          </a:p>
+        </p:txBody>
+      </p:sp>
     </p:spTree>
   </p:cSld>
   <p:clrMapOvr>

</xml_diff>

<commit_message>
Izveidots 3. uzdevums un tā apraksts kā arī pielabots mācību materiāls
</commit_message>
<xml_diff>
--- a/MacibuMaterialsProgEks.pptx
+++ b/MacibuMaterialsProgEks.pptx
@@ -5,7 +5,7 @@
     <p:sldMasterId id="2147483648" r:id="rId1"/>
   </p:sldMasterIdLst>
   <p:handoutMasterIdLst>
-    <p:handoutMasterId r:id="rId20"/>
+    <p:handoutMasterId r:id="rId22"/>
   </p:handoutMasterIdLst>
   <p:sldIdLst>
     <p:sldId id="256" r:id="rId3"/>
@@ -25,6 +25,8 @@
     <p:sldId id="270" r:id="rId17"/>
     <p:sldId id="271" r:id="rId18"/>
     <p:sldId id="272" r:id="rId19"/>
+    <p:sldId id="273" r:id="rId20"/>
+    <p:sldId id="274" r:id="rId21"/>
   </p:sldIdLst>
   <p:sldSz cx="12192000" cy="6858000"/>
   <p:notesSz cx="6858000" cy="9144000"/>
@@ -4154,7 +4156,11 @@
         <p:txBody>
           <a:bodyPr/>
           <a:p>
-            <a:endParaRPr lang="en-US"/>
+            <a:r>
+              <a:rPr lang="en-US" altLang="en-US"/>
+              <a:t>Izstrādā programmu kas prasa lietotājam ievadīt teikumu un tiek noteikts un izvadīts katra simbola tips (Lielais burts/Mazais burts, cipars, atstarpe, speciālais simbols), tiek skaitīts katra simbola tips un beigās izvadīts katra simbola tipa skaits</a:t>
+            </a:r>
+            <a:endParaRPr lang="en-US" altLang="en-US"/>
           </a:p>
         </p:txBody>
       </p:sp>
@@ -4198,6 +4204,186 @@
           </a:p>
         </p:txBody>
       </p:sp>
+      <p:pic>
+        <p:nvPicPr>
+          <p:cNvPr id="4" name="Content Placeholder 3"/>
+          <p:cNvPicPr>
+            <a:picLocks noChangeAspect="1"/>
+          </p:cNvPicPr>
+          <p:nvPr>
+            <p:ph idx="1"/>
+          </p:nvPr>
+        </p:nvPicPr>
+        <p:blipFill>
+          <a:blip r:embed="rId1"/>
+          <a:stretch>
+            <a:fillRect/>
+          </a:stretch>
+        </p:blipFill>
+        <p:spPr>
+          <a:xfrm>
+            <a:off x="296545" y="1691005"/>
+            <a:ext cx="3865245" cy="2893060"/>
+          </a:xfrm>
+          <a:prstGeom prst="rect">
+            <a:avLst/>
+          </a:prstGeom>
+        </p:spPr>
+      </p:pic>
+      <p:pic>
+        <p:nvPicPr>
+          <p:cNvPr id="6" name="Picture 5"/>
+          <p:cNvPicPr>
+            <a:picLocks noChangeAspect="1"/>
+          </p:cNvPicPr>
+          <p:nvPr/>
+        </p:nvPicPr>
+        <p:blipFill>
+          <a:blip r:embed="rId2"/>
+          <a:stretch>
+            <a:fillRect/>
+          </a:stretch>
+        </p:blipFill>
+        <p:spPr>
+          <a:xfrm>
+            <a:off x="4223385" y="1691005"/>
+            <a:ext cx="3923030" cy="4547235"/>
+          </a:xfrm>
+          <a:prstGeom prst="rect">
+            <a:avLst/>
+          </a:prstGeom>
+        </p:spPr>
+      </p:pic>
+      <p:pic>
+        <p:nvPicPr>
+          <p:cNvPr id="8" name="Picture 7"/>
+          <p:cNvPicPr>
+            <a:picLocks noChangeAspect="1"/>
+          </p:cNvPicPr>
+          <p:nvPr/>
+        </p:nvPicPr>
+        <p:blipFill>
+          <a:blip r:embed="rId3"/>
+          <a:stretch>
+            <a:fillRect/>
+          </a:stretch>
+        </p:blipFill>
+        <p:spPr>
+          <a:xfrm>
+            <a:off x="8208010" y="4930140"/>
+            <a:ext cx="3903980" cy="1236980"/>
+          </a:xfrm>
+          <a:prstGeom prst="rect">
+            <a:avLst/>
+          </a:prstGeom>
+        </p:spPr>
+      </p:pic>
+    </p:spTree>
+  </p:cSld>
+  <p:clrMapOvr>
+    <a:masterClrMapping/>
+  </p:clrMapOvr>
+</p:sld>
+</file>
+
+<file path=ppt/slides/slide18.xml><?xml version="1.0" encoding="utf-8"?>
+<p:sld xmlns:a="http://schemas.openxmlformats.org/drawingml/2006/main" xmlns:r="http://schemas.openxmlformats.org/officeDocument/2006/relationships" xmlns:p="http://schemas.openxmlformats.org/presentationml/2006/main">
+  <p:cSld>
+    <p:spTree>
+      <p:nvGrpSpPr>
+        <p:cNvPr id="1" name=""/>
+        <p:cNvGrpSpPr/>
+        <p:nvPr/>
+      </p:nvGrpSpPr>
+      <p:grpSpPr/>
+      <p:sp>
+        <p:nvSpPr>
+          <p:cNvPr id="2" name="Title 1"/>
+          <p:cNvSpPr>
+            <a:spLocks noGrp="1"/>
+          </p:cNvSpPr>
+          <p:nvPr>
+            <p:ph type="title"/>
+          </p:nvPr>
+        </p:nvSpPr>
+        <p:spPr/>
+        <p:txBody>
+          <a:bodyPr/>
+          <a:p>
+            <a:r>
+              <a:rPr lang="en-US"/>
+              <a:t>3. Uzdevuma rezultāts</a:t>
+            </a:r>
+            <a:endParaRPr lang="en-US"/>
+          </a:p>
+        </p:txBody>
+      </p:sp>
+      <p:pic>
+        <p:nvPicPr>
+          <p:cNvPr id="4" name="Content Placeholder 3"/>
+          <p:cNvPicPr>
+            <a:picLocks noChangeAspect="1"/>
+          </p:cNvPicPr>
+          <p:nvPr>
+            <p:ph idx="1"/>
+          </p:nvPr>
+        </p:nvPicPr>
+        <p:blipFill>
+          <a:blip r:embed="rId1"/>
+          <a:stretch>
+            <a:fillRect/>
+          </a:stretch>
+        </p:blipFill>
+        <p:spPr>
+          <a:xfrm>
+            <a:off x="1038860" y="1691005"/>
+            <a:ext cx="2965450" cy="4739640"/>
+          </a:xfrm>
+          <a:prstGeom prst="rect">
+            <a:avLst/>
+          </a:prstGeom>
+        </p:spPr>
+      </p:pic>
+    </p:spTree>
+  </p:cSld>
+  <p:clrMapOvr>
+    <a:masterClrMapping/>
+  </p:clrMapOvr>
+</p:sld>
+</file>
+
+<file path=ppt/slides/slide19.xml><?xml version="1.0" encoding="utf-8"?>
+<p:sld xmlns:a="http://schemas.openxmlformats.org/drawingml/2006/main" xmlns:r="http://schemas.openxmlformats.org/officeDocument/2006/relationships" xmlns:p="http://schemas.openxmlformats.org/presentationml/2006/main">
+  <p:cSld>
+    <p:spTree>
+      <p:nvGrpSpPr>
+        <p:cNvPr id="1" name=""/>
+        <p:cNvGrpSpPr/>
+        <p:nvPr/>
+      </p:nvGrpSpPr>
+      <p:grpSpPr/>
+      <p:sp>
+        <p:nvSpPr>
+          <p:cNvPr id="2" name="Title 1"/>
+          <p:cNvSpPr>
+            <a:spLocks noGrp="1"/>
+          </p:cNvSpPr>
+          <p:nvPr>
+            <p:ph type="title"/>
+          </p:nvPr>
+        </p:nvSpPr>
+        <p:spPr/>
+        <p:txBody>
+          <a:bodyPr/>
+          <a:p>
+            <a:r>
+              <a:rPr lang="en-US"/>
+              <a:t>Atsauces</a:t>
+            </a:r>
+            <a:endParaRPr lang="en-US"/>
+          </a:p>
+        </p:txBody>
+      </p:sp>
       <p:sp>
         <p:nvSpPr>
           <p:cNvPr id="3" name="Content Placeholder 2"/>
@@ -4210,9 +4396,78 @@
         </p:nvSpPr>
         <p:spPr/>
         <p:txBody>
-          <a:bodyPr/>
-          <a:p>
-            <a:endParaRPr lang="en-US"/>
+          <a:bodyPr>
+            <a:normAutofit lnSpcReduction="20000"/>
+          </a:bodyPr>
+          <a:p>
+            <a:r>
+              <a:rPr lang="en-US" altLang="en-US"/>
+              <a:t>https://www.w3schools.com/java/java_strings.asp</a:t>
+            </a:r>
+            <a:endParaRPr lang="en-US" altLang="en-US"/>
+          </a:p>
+          <a:p>
+            <a:r>
+              <a:rPr lang="en-US" altLang="en-US"/>
+              <a:t>https://www.w3schools.com/java/java_data_types_characters.asp</a:t>
+            </a:r>
+            <a:endParaRPr lang="en-US" altLang="en-US"/>
+          </a:p>
+          <a:p>
+            <a:r>
+              <a:rPr lang="en-US" altLang="en-US"/>
+              <a:t>https://www.geeksforgeeks.org/character-class-java/</a:t>
+            </a:r>
+            <a:endParaRPr lang="en-US" altLang="en-US"/>
+          </a:p>
+          <a:p>
+            <a:r>
+              <a:rPr lang="en-US" altLang="en-US"/>
+              <a:t>https://www.tutorialspoint.com/java/character_iswhitespace.htm</a:t>
+            </a:r>
+            <a:endParaRPr lang="en-US" altLang="en-US"/>
+          </a:p>
+          <a:p>
+            <a:r>
+              <a:rPr lang="en-US" altLang="en-US"/>
+              <a:t>https://www.w3schools.com/java/ref_string_compareto.asp</a:t>
+            </a:r>
+            <a:endParaRPr lang="en-US" altLang="en-US"/>
+          </a:p>
+          <a:p>
+            <a:r>
+              <a:rPr lang="en-US" altLang="en-US"/>
+              <a:t>https://www.w3schools.com/java/ref_string_charat.asp</a:t>
+            </a:r>
+            <a:endParaRPr lang="en-US" altLang="en-US"/>
+          </a:p>
+          <a:p>
+            <a:r>
+              <a:rPr lang="en-US" altLang="en-US"/>
+              <a:t>https://www.w3schools.com/java/ref_string_equals.asp</a:t>
+            </a:r>
+            <a:endParaRPr lang="en-US" altLang="en-US"/>
+          </a:p>
+          <a:p>
+            <a:r>
+              <a:rPr lang="en-US" altLang="en-US"/>
+              <a:t>https://www.w3schools.com/java/ref_string_equals.asp#gsc.tab=0</a:t>
+            </a:r>
+            <a:endParaRPr lang="en-US" altLang="en-US"/>
+          </a:p>
+          <a:p>
+            <a:r>
+              <a:rPr lang="en-US" altLang="en-US"/>
+              <a:t>https://www.w3schools.com/java/ref_string_touppercase.asp</a:t>
+            </a:r>
+            <a:endParaRPr lang="en-US" altLang="en-US"/>
+          </a:p>
+          <a:p>
+            <a:r>
+              <a:rPr lang="en-US" altLang="en-US"/>
+              <a:t>https://chatgpt.com</a:t>
+            </a:r>
+            <a:endParaRPr lang="en-US" altLang="en-US"/>
           </a:p>
         </p:txBody>
       </p:sp>
@@ -4318,30 +4573,6 @@
           </a:prstGeom>
         </p:spPr>
       </p:pic>
-      <p:pic>
-        <p:nvPicPr>
-          <p:cNvPr id="6" name="Picture 5"/>
-          <p:cNvPicPr>
-            <a:picLocks noChangeAspect="1"/>
-          </p:cNvPicPr>
-          <p:nvPr/>
-        </p:nvPicPr>
-        <p:blipFill>
-          <a:blip r:embed="rId2"/>
-          <a:stretch>
-            <a:fillRect/>
-          </a:stretch>
-        </p:blipFill>
-        <p:spPr>
-          <a:xfrm>
-            <a:off x="7069455" y="3331210"/>
-            <a:ext cx="454025" cy="501015"/>
-          </a:xfrm>
-          <a:prstGeom prst="rect">
-            <a:avLst/>
-          </a:prstGeom>
-        </p:spPr>
-      </p:pic>
       <p:sp>
         <p:nvSpPr>
           <p:cNvPr id="7" name="Text Box 6"/>
@@ -4351,7 +4582,7 @@
         <p:spPr>
           <a:xfrm>
             <a:off x="6873875" y="2854960"/>
-            <a:ext cx="1403350" cy="368300"/>
+            <a:ext cx="1403350" cy="645160"/>
           </a:xfrm>
           <a:prstGeom prst="rect">
             <a:avLst/>
@@ -4366,6 +4597,13 @@
             <a:r>
               <a:rPr lang="en-US"/>
               <a:t>Izvade:</a:t>
+            </a:r>
+            <a:endParaRPr lang="en-US"/>
+          </a:p>
+          <a:p>
+            <a:r>
+              <a:rPr lang="en-US"/>
+              <a:t>B</a:t>
             </a:r>
             <a:endParaRPr lang="en-US"/>
           </a:p>
@@ -4465,30 +4703,6 @@
           </a:prstGeom>
         </p:spPr>
       </p:pic>
-      <p:pic>
-        <p:nvPicPr>
-          <p:cNvPr id="5" name="Picture 4"/>
-          <p:cNvPicPr>
-            <a:picLocks noChangeAspect="1"/>
-          </p:cNvPicPr>
-          <p:nvPr/>
-        </p:nvPicPr>
-        <p:blipFill>
-          <a:blip r:embed="rId2"/>
-          <a:stretch>
-            <a:fillRect/>
-          </a:stretch>
-        </p:blipFill>
-        <p:spPr>
-          <a:xfrm>
-            <a:off x="6929755" y="3152775"/>
-            <a:ext cx="730250" cy="365125"/>
-          </a:xfrm>
-          <a:prstGeom prst="rect">
-            <a:avLst/>
-          </a:prstGeom>
-        </p:spPr>
-      </p:pic>
       <p:sp>
         <p:nvSpPr>
           <p:cNvPr id="7" name="Text Box 6"/>
@@ -4498,7 +4712,7 @@
         <p:spPr>
           <a:xfrm>
             <a:off x="6873875" y="2694940"/>
-            <a:ext cx="1403350" cy="368300"/>
+            <a:ext cx="1403350" cy="645160"/>
           </a:xfrm>
           <a:prstGeom prst="rect">
             <a:avLst/>
@@ -4513,6 +4727,13 @@
             <a:r>
               <a:rPr lang="en-US"/>
               <a:t>Izvade:</a:t>
+            </a:r>
+            <a:endParaRPr lang="en-US"/>
+          </a:p>
+          <a:p>
+            <a:r>
+              <a:rPr lang="en-US"/>
+              <a:t>Hello</a:t>
             </a:r>
             <a:endParaRPr lang="en-US"/>
           </a:p>
@@ -4847,6 +5068,10 @@
             <a:endParaRPr lang="en-US" altLang="en-US"/>
           </a:p>
           <a:p>
+            <a:pPr lvl="0"/>
+            <a:endParaRPr lang="en-US" altLang="en-US"/>
+          </a:p>
+          <a:p>
             <a:pPr lvl="1"/>
             <a:endParaRPr lang="en-US" altLang="en-US"/>
           </a:p>
@@ -4908,7 +5133,9 @@
         </p:nvSpPr>
         <p:spPr/>
         <p:txBody>
-          <a:bodyPr/>
+          <a:bodyPr>
+            <a:normAutofit lnSpcReduction="20000"/>
+          </a:bodyPr>
           <a:p>
             <a:r>
               <a:rPr lang="en-US" altLang="en-US"/>
@@ -4958,39 +5185,73 @@
           <a:p>
             <a:pPr lvl="0"/>
             <a:r>
-              <a:rPr lang="en-US" altLang="en-US" sz="2800">
-                <a:sym typeface="+mn-ea"/>
-              </a:rPr>
-              <a:t>.compareTo("b")</a:t>
-            </a:r>
-            <a:endParaRPr lang="en-US" altLang="en-US" sz="2800"/>
-          </a:p>
-          <a:p>
-            <a:pPr lvl="1"/>
+              <a:rPr lang="en-US" altLang="en-US"/>
+              <a:t>.isLowerCase(</a:t>
+            </a:r>
             <a:r>
               <a:rPr lang="en-US" altLang="en-US">
                 <a:sym typeface="+mn-ea"/>
               </a:rPr>
-              <a:t>Salīdzina simbolus pēc Unicode vērtībām</a:t>
+              <a:t>'a'</a:t>
+            </a:r>
+            <a:r>
+              <a:rPr lang="en-US" altLang="en-US"/>
+              <a:t>)</a:t>
             </a:r>
             <a:endParaRPr lang="en-US" altLang="en-US"/>
           </a:p>
           <a:p>
+            <a:pPr lvl="1"/>
+            <a:r>
+              <a:rPr lang="en-US" altLang="en-US"/>
+              <a:t>Pārbauda vai simbols/simbolu virkne ir rakstīta ar mazajiem burtiem</a:t>
+            </a:r>
+            <a:endParaRPr lang="en-US" altLang="en-US"/>
+          </a:p>
+          <a:p>
             <a:pPr lvl="2"/>
+            <a:r>
+              <a:rPr lang="en-US" altLang="en-US"/>
+              <a:t>Atbildes formāts (true, false)</a:t>
+            </a:r>
+            <a:endParaRPr lang="en-US" altLang="en-US"/>
+          </a:p>
+          <a:p>
+            <a:pPr lvl="0"/>
+            <a:r>
+              <a:rPr lang="en-US" altLang="en-US"/>
+              <a:t>.isUpperCase(</a:t>
+            </a:r>
             <a:r>
               <a:rPr lang="en-US" altLang="en-US">
                 <a:sym typeface="+mn-ea"/>
               </a:rPr>
-              <a:t>Atbildes formāts (-1)</a:t>
+              <a:t>'A'</a:t>
+            </a:r>
+            <a:r>
+              <a:rPr lang="en-US" altLang="en-US"/>
+              <a:t>)</a:t>
             </a:r>
             <a:endParaRPr lang="en-US" altLang="en-US"/>
           </a:p>
           <a:p>
-            <a:pPr lvl="0"/>
-            <a:endParaRPr lang="en-US" altLang="en-US"/>
+            <a:pPr lvl="1"/>
+            <a:r>
+              <a:rPr lang="en-US" altLang="en-US">
+                <a:sym typeface="+mn-ea"/>
+              </a:rPr>
+              <a:t>Pārbauda vai simbols/simbolu virkne ir rakstīta ar lielajiem burtiem</a:t>
+            </a:r>
+            <a:endParaRPr lang="en-US" altLang="en-US">
+              <a:sym typeface="+mn-ea"/>
+            </a:endParaRPr>
           </a:p>
           <a:p>
             <a:pPr lvl="2"/>
+            <a:r>
+              <a:rPr lang="en-US" altLang="en-US"/>
+              <a:t>Atbildes formāts (true, false)</a:t>
+            </a:r>
             <a:endParaRPr lang="en-US" altLang="en-US"/>
           </a:p>
         </p:txBody>

</xml_diff>

<commit_message>
Iesākta testa izstrādāšana, izveidoti masīvi ar testa jautājumiem, iespējamām atbildēm un pareizajām atbildēm
</commit_message>
<xml_diff>
--- a/MacibuMaterialsProgEks.pptx
+++ b/MacibuMaterialsProgEks.pptx
@@ -4336,14 +4336,43 @@
         </p:blipFill>
         <p:spPr>
           <a:xfrm>
-            <a:off x="1038860" y="1691005"/>
-            <a:ext cx="2965450" cy="4739640"/>
+            <a:off x="1038860" y="1918335"/>
+            <a:ext cx="2823210" cy="4512310"/>
           </a:xfrm>
           <a:prstGeom prst="rect">
             <a:avLst/>
           </a:prstGeom>
         </p:spPr>
       </p:pic>
+      <p:sp>
+        <p:nvSpPr>
+          <p:cNvPr id="8" name="Text Box 7"/>
+          <p:cNvSpPr txBox="1"/>
+          <p:nvPr/>
+        </p:nvSpPr>
+        <p:spPr>
+          <a:xfrm>
+            <a:off x="1038860" y="1421130"/>
+            <a:ext cx="1146810" cy="368300"/>
+          </a:xfrm>
+          <a:prstGeom prst="rect">
+            <a:avLst/>
+          </a:prstGeom>
+          <a:noFill/>
+        </p:spPr>
+        <p:txBody>
+          <a:bodyPr wrap="square" rtlCol="0">
+            <a:spAutoFit/>
+          </a:bodyPr>
+          <a:p>
+            <a:r>
+              <a:rPr lang="en-US"/>
+              <a:t>Pārbaude:</a:t>
+            </a:r>
+            <a:endParaRPr lang="en-US"/>
+          </a:p>
+        </p:txBody>
+      </p:sp>
     </p:spTree>
   </p:cSld>
   <p:clrMapOvr>

</xml_diff>